<commit_message>
vault backup: 2023-11-19 23:05:16
</commit_message>
<xml_diff>
--- a/Bluetooth/LE Audio/ASCS/LE_Audio_ASCS_sharing.pptx
+++ b/Bluetooth/LE Audio/ASCS/LE_Audio_ASCS_sharing.pptx
@@ -128,7 +128,7 @@
   </p:defaultTextStyle>
   <p:extLst>
     <p:ext uri="{EFAFB233-063F-42B5-8137-9DF3F51BA10A}">
-      <p15:sldGuideLst xmlns:p15="http://schemas.microsoft.com/office/powerpoint/2012/main">
+      <p15:sldGuideLst xmlns:p15="http://schemas.microsoft.com/office/powerpoint/2012/main" xmlns="">
         <p15:guide id="1" orient="horz" pos="2160">
           <p15:clr>
             <a:srgbClr val="A4A3A4"/>
@@ -142,7 +142,7 @@
       </p15:sldGuideLst>
     </p:ext>
     <p:ext uri="{2D200454-40CA-4A62-9FC3-DE9A4176ACB9}">
-      <p15:notesGuideLst xmlns:p15="http://schemas.microsoft.com/office/powerpoint/2012/main"/>
+      <p15:notesGuideLst xmlns:p15="http://schemas.microsoft.com/office/powerpoint/2012/main" xmlns=""/>
     </p:ext>
   </p:extLst>
 </p:presentation>
@@ -153,7 +153,7 @@
   <p:cmAuthor id="1" name="Zhang, Gail" initials="ZG" lastIdx="1" clrIdx="0">
     <p:extLst>
       <p:ext uri="{19B8F6BF-5375-455C-9EA6-DF929625EA0E}">
-        <p15:presenceInfo xmlns:p15="http://schemas.microsoft.com/office/powerpoint/2012/main" userId="S-1-5-21-1238556467-1463016181-1696733697-22017" providerId="AD"/>
+        <p15:presenceInfo xmlns:p15="http://schemas.microsoft.com/office/powerpoint/2012/main" xmlns="" userId="S-1-5-21-1238556467-1463016181-1696733697-22017" providerId="AD"/>
       </p:ext>
     </p:extLst>
   </p:cmAuthor>
@@ -243,7 +243,7 @@
             <a:fld id="{C71D4305-0E5C-4FA1-B2F8-0DA27C65EA29}" type="datetimeFigureOut">
               <a:rPr lang="zh-CN" altLang="en-US" smtClean="0"/>
               <a:pPr/>
-              <a:t>2023/11/18</a:t>
+              <a:t>2023/11/19</a:t>
             </a:fld>
             <a:endParaRPr lang="zh-CN" altLang="en-US"/>
           </a:p>
@@ -319,7 +319,7 @@
     </p:spTree>
     <p:extLst>
       <p:ext uri="{BB962C8B-B14F-4D97-AF65-F5344CB8AC3E}">
-        <p14:creationId xmlns:p14="http://schemas.microsoft.com/office/powerpoint/2010/main" val="4068278073"/>
+        <p14:creationId xmlns:p14="http://schemas.microsoft.com/office/powerpoint/2010/main" xmlns="" val="4068278073"/>
       </p:ext>
     </p:extLst>
   </p:cSld>
@@ -410,7 +410,7 @@
             <a:fld id="{0F580D0B-8D00-4DBF-9D3E-DD6CF5D9A421}" type="datetimeFigureOut">
               <a:rPr lang="zh-CN" altLang="en-US" smtClean="0"/>
               <a:pPr/>
-              <a:t>2023/11/18</a:t>
+              <a:t>2023/11/19</a:t>
             </a:fld>
             <a:endParaRPr lang="zh-CN" altLang="en-US"/>
           </a:p>
@@ -578,7 +578,7 @@
     </p:spTree>
     <p:extLst>
       <p:ext uri="{BB962C8B-B14F-4D97-AF65-F5344CB8AC3E}">
-        <p14:creationId xmlns:p14="http://schemas.microsoft.com/office/powerpoint/2010/main" val="2152367921"/>
+        <p14:creationId xmlns:p14="http://schemas.microsoft.com/office/powerpoint/2010/main" xmlns="" val="2152367921"/>
       </p:ext>
     </p:extLst>
   </p:cSld>
@@ -840,7 +840,7 @@
     </p:spTree>
     <p:extLst>
       <p:ext uri="{BB962C8B-B14F-4D97-AF65-F5344CB8AC3E}">
-        <p14:creationId xmlns:p14="http://schemas.microsoft.com/office/powerpoint/2010/main" val="3345378963"/>
+        <p14:creationId xmlns:p14="http://schemas.microsoft.com/office/powerpoint/2010/main" xmlns="" val="3345378963"/>
       </p:ext>
     </p:extLst>
   </p:cSld>
@@ -927,7 +927,7 @@
     </p:spTree>
     <p:extLst>
       <p:ext uri="{BB962C8B-B14F-4D97-AF65-F5344CB8AC3E}">
-        <p14:creationId xmlns:p14="http://schemas.microsoft.com/office/powerpoint/2010/main" val="2093896556"/>
+        <p14:creationId xmlns:p14="http://schemas.microsoft.com/office/powerpoint/2010/main" xmlns="" val="2093896556"/>
       </p:ext>
     </p:extLst>
   </p:cSld>
@@ -1014,7 +1014,7 @@
     </p:spTree>
     <p:extLst>
       <p:ext uri="{BB962C8B-B14F-4D97-AF65-F5344CB8AC3E}">
-        <p14:creationId xmlns:p14="http://schemas.microsoft.com/office/powerpoint/2010/main" val="713044977"/>
+        <p14:creationId xmlns:p14="http://schemas.microsoft.com/office/powerpoint/2010/main" xmlns="" val="713044977"/>
       </p:ext>
     </p:extLst>
   </p:cSld>
@@ -1101,7 +1101,7 @@
     </p:spTree>
     <p:extLst>
       <p:ext uri="{BB962C8B-B14F-4D97-AF65-F5344CB8AC3E}">
-        <p14:creationId xmlns:p14="http://schemas.microsoft.com/office/powerpoint/2010/main" val="819685659"/>
+        <p14:creationId xmlns:p14="http://schemas.microsoft.com/office/powerpoint/2010/main" xmlns="" val="819685659"/>
       </p:ext>
     </p:extLst>
   </p:cSld>
@@ -1188,7 +1188,7 @@
     </p:spTree>
     <p:extLst>
       <p:ext uri="{BB962C8B-B14F-4D97-AF65-F5344CB8AC3E}">
-        <p14:creationId xmlns:p14="http://schemas.microsoft.com/office/powerpoint/2010/main" val="1343150992"/>
+        <p14:creationId xmlns:p14="http://schemas.microsoft.com/office/powerpoint/2010/main" xmlns="" val="1343150992"/>
       </p:ext>
     </p:extLst>
   </p:cSld>
@@ -1275,7 +1275,7 @@
     </p:spTree>
     <p:extLst>
       <p:ext uri="{BB962C8B-B14F-4D97-AF65-F5344CB8AC3E}">
-        <p14:creationId xmlns:p14="http://schemas.microsoft.com/office/powerpoint/2010/main" val="1765919934"/>
+        <p14:creationId xmlns:p14="http://schemas.microsoft.com/office/powerpoint/2010/main" xmlns="" val="1765919934"/>
       </p:ext>
     </p:extLst>
   </p:cSld>
@@ -1444,7 +1444,7 @@
     </p:spTree>
     <p:extLst>
       <p:ext uri="{BB962C8B-B14F-4D97-AF65-F5344CB8AC3E}">
-        <p14:creationId xmlns:p14="http://schemas.microsoft.com/office/powerpoint/2010/main" val="727556816"/>
+        <p14:creationId xmlns:p14="http://schemas.microsoft.com/office/powerpoint/2010/main" xmlns="" val="727556816"/>
       </p:ext>
     </p:extLst>
   </p:cSld>
@@ -1531,7 +1531,7 @@
     </p:spTree>
     <p:extLst>
       <p:ext uri="{BB962C8B-B14F-4D97-AF65-F5344CB8AC3E}">
-        <p14:creationId xmlns:p14="http://schemas.microsoft.com/office/powerpoint/2010/main" val="3608578992"/>
+        <p14:creationId xmlns:p14="http://schemas.microsoft.com/office/powerpoint/2010/main" xmlns="" val="3608578992"/>
       </p:ext>
     </p:extLst>
   </p:cSld>
@@ -1618,7 +1618,7 @@
     </p:spTree>
     <p:extLst>
       <p:ext uri="{BB962C8B-B14F-4D97-AF65-F5344CB8AC3E}">
-        <p14:creationId xmlns:p14="http://schemas.microsoft.com/office/powerpoint/2010/main" val="56834082"/>
+        <p14:creationId xmlns:p14="http://schemas.microsoft.com/office/powerpoint/2010/main" xmlns="" val="56834082"/>
       </p:ext>
     </p:extLst>
   </p:cSld>
@@ -1705,7 +1705,7 @@
     </p:spTree>
     <p:extLst>
       <p:ext uri="{BB962C8B-B14F-4D97-AF65-F5344CB8AC3E}">
-        <p14:creationId xmlns:p14="http://schemas.microsoft.com/office/powerpoint/2010/main" val="2625567643"/>
+        <p14:creationId xmlns:p14="http://schemas.microsoft.com/office/powerpoint/2010/main" xmlns="" val="2625567643"/>
       </p:ext>
     </p:extLst>
   </p:cSld>
@@ -1792,7 +1792,7 @@
     </p:spTree>
     <p:extLst>
       <p:ext uri="{BB962C8B-B14F-4D97-AF65-F5344CB8AC3E}">
-        <p14:creationId xmlns:p14="http://schemas.microsoft.com/office/powerpoint/2010/main" val="3112180684"/>
+        <p14:creationId xmlns:p14="http://schemas.microsoft.com/office/powerpoint/2010/main" xmlns="" val="3112180684"/>
       </p:ext>
     </p:extLst>
   </p:cSld>
@@ -1879,7 +1879,7 @@
     </p:spTree>
     <p:extLst>
       <p:ext uri="{BB962C8B-B14F-4D97-AF65-F5344CB8AC3E}">
-        <p14:creationId xmlns:p14="http://schemas.microsoft.com/office/powerpoint/2010/main" val="1602054512"/>
+        <p14:creationId xmlns:p14="http://schemas.microsoft.com/office/powerpoint/2010/main" xmlns="" val="1602054512"/>
       </p:ext>
     </p:extLst>
   </p:cSld>
@@ -1966,7 +1966,7 @@
     </p:spTree>
     <p:extLst>
       <p:ext uri="{BB962C8B-B14F-4D97-AF65-F5344CB8AC3E}">
-        <p14:creationId xmlns:p14="http://schemas.microsoft.com/office/powerpoint/2010/main" val="15641418"/>
+        <p14:creationId xmlns:p14="http://schemas.microsoft.com/office/powerpoint/2010/main" xmlns="" val="15641418"/>
       </p:ext>
     </p:extLst>
   </p:cSld>
@@ -2273,7 +2273,7 @@
           <a:blip r:embed="rId2" cstate="print">
             <a:extLst>
               <a:ext uri="{28A0092B-C50C-407E-A947-70E740481C1C}">
-                <a14:useLocalDpi xmlns:a14="http://schemas.microsoft.com/office/drawing/2010/main" val="0"/>
+                <a14:useLocalDpi xmlns:a14="http://schemas.microsoft.com/office/drawing/2010/main" xmlns="" val="0"/>
               </a:ext>
             </a:extLst>
           </a:blip>
@@ -2384,7 +2384,7 @@
     </p:spTree>
     <p:extLst>
       <p:ext uri="{BB962C8B-B14F-4D97-AF65-F5344CB8AC3E}">
-        <p14:creationId xmlns:p14="http://schemas.microsoft.com/office/powerpoint/2010/main" val="1073059546"/>
+        <p14:creationId xmlns:p14="http://schemas.microsoft.com/office/powerpoint/2010/main" xmlns="" val="1073059546"/>
       </p:ext>
     </p:extLst>
   </p:cSld>
@@ -2633,7 +2633,7 @@
     </p:spTree>
     <p:extLst>
       <p:ext uri="{BB962C8B-B14F-4D97-AF65-F5344CB8AC3E}">
-        <p14:creationId xmlns:p14="http://schemas.microsoft.com/office/powerpoint/2010/main" val="2822298554"/>
+        <p14:creationId xmlns:p14="http://schemas.microsoft.com/office/powerpoint/2010/main" xmlns="" val="2822298554"/>
       </p:ext>
     </p:extLst>
   </p:cSld>
@@ -2799,7 +2799,7 @@
     </p:spTree>
     <p:extLst>
       <p:ext uri="{BB962C8B-B14F-4D97-AF65-F5344CB8AC3E}">
-        <p14:creationId xmlns:p14="http://schemas.microsoft.com/office/powerpoint/2010/main" val="490058353"/>
+        <p14:creationId xmlns:p14="http://schemas.microsoft.com/office/powerpoint/2010/main" xmlns="" val="490058353"/>
       </p:ext>
     </p:extLst>
   </p:cSld>
@@ -2975,7 +2975,7 @@
     </p:spTree>
     <p:extLst>
       <p:ext uri="{BB962C8B-B14F-4D97-AF65-F5344CB8AC3E}">
-        <p14:creationId xmlns:p14="http://schemas.microsoft.com/office/powerpoint/2010/main" val="976665096"/>
+        <p14:creationId xmlns:p14="http://schemas.microsoft.com/office/powerpoint/2010/main" xmlns="" val="976665096"/>
       </p:ext>
     </p:extLst>
   </p:cSld>
@@ -3034,7 +3034,7 @@
                 </a:solidFill>
               </a:rPr>
               <a:pPr/>
-              <a:t>2023/11/18</a:t>
+              <a:t>2023/11/19</a:t>
             </a:fld>
             <a:endParaRPr lang="zh-CN" altLang="en-US">
               <a:solidFill>
@@ -3165,7 +3165,7 @@
           <a:blip r:embed="rId2" cstate="print">
             <a:extLst>
               <a:ext uri="{28A0092B-C50C-407E-A947-70E740481C1C}">
-                <a14:useLocalDpi xmlns:a14="http://schemas.microsoft.com/office/drawing/2010/main" val="0"/>
+                <a14:useLocalDpi xmlns:a14="http://schemas.microsoft.com/office/drawing/2010/main" xmlns="" val="0"/>
               </a:ext>
             </a:extLst>
           </a:blip>
@@ -3186,7 +3186,7 @@
     </p:spTree>
     <p:extLst>
       <p:ext uri="{BB962C8B-B14F-4D97-AF65-F5344CB8AC3E}">
-        <p14:creationId xmlns:p14="http://schemas.microsoft.com/office/powerpoint/2010/main" val="2431250738"/>
+        <p14:creationId xmlns:p14="http://schemas.microsoft.com/office/powerpoint/2010/main" xmlns="" val="2431250738"/>
       </p:ext>
     </p:extLst>
   </p:cSld>
@@ -3470,7 +3470,7 @@
     </p:spTree>
     <p:extLst>
       <p:ext uri="{BB962C8B-B14F-4D97-AF65-F5344CB8AC3E}">
-        <p14:creationId xmlns:p14="http://schemas.microsoft.com/office/powerpoint/2010/main" val="615339305"/>
+        <p14:creationId xmlns:p14="http://schemas.microsoft.com/office/powerpoint/2010/main" xmlns="" val="615339305"/>
       </p:ext>
     </p:extLst>
   </p:cSld>
@@ -3796,7 +3796,7 @@
     </p:spTree>
     <p:extLst>
       <p:ext uri="{BB962C8B-B14F-4D97-AF65-F5344CB8AC3E}">
-        <p14:creationId xmlns:p14="http://schemas.microsoft.com/office/powerpoint/2010/main" val="463769042"/>
+        <p14:creationId xmlns:p14="http://schemas.microsoft.com/office/powerpoint/2010/main" xmlns="" val="463769042"/>
       </p:ext>
     </p:extLst>
   </p:cSld>
@@ -4068,7 +4068,7 @@
                 </a:solidFill>
               </a:rPr>
               <a:pPr/>
-              <a:t>2023/11/18</a:t>
+              <a:t>2023/11/19</a:t>
             </a:fld>
             <a:endParaRPr lang="zh-CN" altLang="en-US">
               <a:solidFill>
@@ -4158,7 +4158,7 @@
     </p:spTree>
     <p:extLst>
       <p:ext uri="{BB962C8B-B14F-4D97-AF65-F5344CB8AC3E}">
-        <p14:creationId xmlns:p14="http://schemas.microsoft.com/office/powerpoint/2010/main" val="629156596"/>
+        <p14:creationId xmlns:p14="http://schemas.microsoft.com/office/powerpoint/2010/main" xmlns="" val="629156596"/>
       </p:ext>
     </p:extLst>
   </p:cSld>
@@ -4595,7 +4595,7 @@
     </p:spTree>
     <p:extLst>
       <p:ext uri="{BB962C8B-B14F-4D97-AF65-F5344CB8AC3E}">
-        <p14:creationId xmlns:p14="http://schemas.microsoft.com/office/powerpoint/2010/main" val="4032619214"/>
+        <p14:creationId xmlns:p14="http://schemas.microsoft.com/office/powerpoint/2010/main" xmlns="" val="4032619214"/>
       </p:ext>
     </p:extLst>
   </p:cSld>
@@ -4677,7 +4677,7 @@
                 </a:solidFill>
               </a:rPr>
               <a:pPr/>
-              <a:t>2023/11/18</a:t>
+              <a:t>2023/11/19</a:t>
             </a:fld>
             <a:endParaRPr lang="zh-CN" altLang="en-US">
               <a:solidFill>
@@ -4753,7 +4753,7 @@
     </p:spTree>
     <p:extLst>
       <p:ext uri="{BB962C8B-B14F-4D97-AF65-F5344CB8AC3E}">
-        <p14:creationId xmlns:p14="http://schemas.microsoft.com/office/powerpoint/2010/main" val="1910889773"/>
+        <p14:creationId xmlns:p14="http://schemas.microsoft.com/office/powerpoint/2010/main" xmlns="" val="1910889773"/>
       </p:ext>
     </p:extLst>
   </p:cSld>
@@ -4812,7 +4812,7 @@
                 </a:solidFill>
               </a:rPr>
               <a:pPr/>
-              <a:t>2023/11/18</a:t>
+              <a:t>2023/11/19</a:t>
             </a:fld>
             <a:endParaRPr lang="zh-CN" altLang="en-US">
               <a:solidFill>
@@ -4888,7 +4888,7 @@
     </p:spTree>
     <p:extLst>
       <p:ext uri="{BB962C8B-B14F-4D97-AF65-F5344CB8AC3E}">
-        <p14:creationId xmlns:p14="http://schemas.microsoft.com/office/powerpoint/2010/main" val="4256903874"/>
+        <p14:creationId xmlns:p14="http://schemas.microsoft.com/office/powerpoint/2010/main" xmlns="" val="4256903874"/>
       </p:ext>
     </p:extLst>
   </p:cSld>
@@ -4947,7 +4947,7 @@
                 </a:solidFill>
               </a:rPr>
               <a:pPr/>
-              <a:t>2023/11/18</a:t>
+              <a:t>2023/11/19</a:t>
             </a:fld>
             <a:endParaRPr lang="zh-CN" altLang="en-US">
               <a:solidFill>
@@ -5079,7 +5079,7 @@
             <a:biLevel thresh="25000"/>
             <a:extLst>
               <a:ext uri="{28A0092B-C50C-407E-A947-70E740481C1C}">
-                <a14:useLocalDpi xmlns:a14="http://schemas.microsoft.com/office/drawing/2010/main" val="0"/>
+                <a14:useLocalDpi xmlns:a14="http://schemas.microsoft.com/office/drawing/2010/main" xmlns="" val="0"/>
               </a:ext>
             </a:extLst>
           </a:blip>
@@ -5100,7 +5100,7 @@
     </p:spTree>
     <p:extLst>
       <p:ext uri="{BB962C8B-B14F-4D97-AF65-F5344CB8AC3E}">
-        <p14:creationId xmlns:p14="http://schemas.microsoft.com/office/powerpoint/2010/main" val="3430925310"/>
+        <p14:creationId xmlns:p14="http://schemas.microsoft.com/office/powerpoint/2010/main" xmlns="" val="3430925310"/>
       </p:ext>
     </p:extLst>
   </p:cSld>
@@ -5373,7 +5373,7 @@
     </p:spTree>
     <p:extLst>
       <p:ext uri="{BB962C8B-B14F-4D97-AF65-F5344CB8AC3E}">
-        <p14:creationId xmlns:p14="http://schemas.microsoft.com/office/powerpoint/2010/main" val="88788940"/>
+        <p14:creationId xmlns:p14="http://schemas.microsoft.com/office/powerpoint/2010/main" xmlns="" val="88788940"/>
       </p:ext>
     </p:extLst>
   </p:cSld>
@@ -5659,7 +5659,7 @@
           <a:blip r:embed="rId15" cstate="print">
             <a:extLst>
               <a:ext uri="{28A0092B-C50C-407E-A947-70E740481C1C}">
-                <a14:useLocalDpi xmlns:a14="http://schemas.microsoft.com/office/drawing/2010/main" val="0"/>
+                <a14:useLocalDpi xmlns:a14="http://schemas.microsoft.com/office/drawing/2010/main" xmlns="" val="0"/>
               </a:ext>
             </a:extLst>
           </a:blip>
@@ -5733,7 +5733,7 @@
     </p:spTree>
     <p:extLst>
       <p:ext uri="{BB962C8B-B14F-4D97-AF65-F5344CB8AC3E}">
-        <p14:creationId xmlns:p14="http://schemas.microsoft.com/office/powerpoint/2010/main" val="2568424594"/>
+        <p14:creationId xmlns:p14="http://schemas.microsoft.com/office/powerpoint/2010/main" xmlns="" val="2568424594"/>
       </p:ext>
     </p:extLst>
   </p:cSld>
@@ -6093,6 +6093,10 @@
           </a:bodyPr>
           <a:lstStyle/>
           <a:p>
+            <a:r>
+              <a:rPr lang="en-US" altLang="zh-CN" dirty="0"/>
+              <a:t/>
+            </a:r>
             <a:br>
               <a:rPr lang="en-US" altLang="zh-CN" dirty="0"/>
             </a:br>
@@ -6162,7 +6166,7 @@
     </p:spTree>
     <p:extLst>
       <p:ext uri="{BB962C8B-B14F-4D97-AF65-F5344CB8AC3E}">
-        <p14:creationId xmlns:p14="http://schemas.microsoft.com/office/powerpoint/2010/main" val="2195611975"/>
+        <p14:creationId xmlns:p14="http://schemas.microsoft.com/office/powerpoint/2010/main" xmlns="" val="2195611975"/>
       </p:ext>
     </p:extLst>
   </p:cSld>
@@ -6254,7 +6258,7 @@
           <p:cNvPr id="5" name="Content Placeholder 2">
             <a:extLst>
               <a:ext uri="{FF2B5EF4-FFF2-40B4-BE49-F238E27FC236}">
-                <a16:creationId xmlns:a16="http://schemas.microsoft.com/office/drawing/2014/main" id="{22A1C46C-0F2B-62A6-587A-0349E7CF9B95}"/>
+                <a16:creationId xmlns:a16="http://schemas.microsoft.com/office/drawing/2014/main" xmlns="" id="{22A1C46C-0F2B-62A6-587A-0349E7CF9B95}"/>
               </a:ext>
             </a:extLst>
           </p:cNvPr>
@@ -6620,7 +6624,7 @@
           <p:cNvPr id="4" name="图片 3">
             <a:extLst>
               <a:ext uri="{FF2B5EF4-FFF2-40B4-BE49-F238E27FC236}">
-                <a16:creationId xmlns:a16="http://schemas.microsoft.com/office/drawing/2014/main" id="{832C3E20-E589-93B8-2D3F-2A18B1CFCBFE}"/>
+                <a16:creationId xmlns:a16="http://schemas.microsoft.com/office/drawing/2014/main" xmlns="" id="{832C3E20-E589-93B8-2D3F-2A18B1CFCBFE}"/>
               </a:ext>
             </a:extLst>
           </p:cNvPr>
@@ -6630,10 +6634,10 @@
           <p:nvPr/>
         </p:nvPicPr>
         <p:blipFill>
-          <a:blip r:embed="rId3">
+          <a:blip r:embed="rId3" cstate="print">
             <a:extLst>
               <a:ext uri="{28A0092B-C50C-407E-A947-70E740481C1C}">
-                <a14:useLocalDpi xmlns:a14="http://schemas.microsoft.com/office/drawing/2010/main" val="0"/>
+                <a14:useLocalDpi xmlns:a14="http://schemas.microsoft.com/office/drawing/2010/main" xmlns="" val="0"/>
               </a:ext>
             </a:extLst>
           </a:blip>
@@ -6656,7 +6660,7 @@
           <p:cNvPr id="7" name="图片 6">
             <a:extLst>
               <a:ext uri="{FF2B5EF4-FFF2-40B4-BE49-F238E27FC236}">
-                <a16:creationId xmlns:a16="http://schemas.microsoft.com/office/drawing/2014/main" id="{889CF5BC-2156-9B3A-D7F7-D2B110E6198F}"/>
+                <a16:creationId xmlns:a16="http://schemas.microsoft.com/office/drawing/2014/main" xmlns="" id="{889CF5BC-2156-9B3A-D7F7-D2B110E6198F}"/>
               </a:ext>
             </a:extLst>
           </p:cNvPr>
@@ -6666,10 +6670,10 @@
           <p:nvPr/>
         </p:nvPicPr>
         <p:blipFill>
-          <a:blip r:embed="rId4">
+          <a:blip r:embed="rId4" cstate="print">
             <a:extLst>
               <a:ext uri="{28A0092B-C50C-407E-A947-70E740481C1C}">
-                <a14:useLocalDpi xmlns:a14="http://schemas.microsoft.com/office/drawing/2010/main" val="0"/>
+                <a14:useLocalDpi xmlns:a14="http://schemas.microsoft.com/office/drawing/2010/main" xmlns="" val="0"/>
               </a:ext>
             </a:extLst>
           </a:blip>
@@ -6692,7 +6696,7 @@
           <p:cNvPr id="9" name="文本框 8">
             <a:extLst>
               <a:ext uri="{FF2B5EF4-FFF2-40B4-BE49-F238E27FC236}">
-                <a16:creationId xmlns:a16="http://schemas.microsoft.com/office/drawing/2014/main" id="{8DA4F497-0A6B-FD92-96DC-86692EBACE37}"/>
+                <a16:creationId xmlns:a16="http://schemas.microsoft.com/office/drawing/2014/main" xmlns="" id="{8DA4F497-0A6B-FD92-96DC-86692EBACE37}"/>
               </a:ext>
             </a:extLst>
           </p:cNvPr>
@@ -6735,7 +6739,7 @@
           <p:cNvPr id="10" name="文本框 9">
             <a:extLst>
               <a:ext uri="{FF2B5EF4-FFF2-40B4-BE49-F238E27FC236}">
-                <a16:creationId xmlns:a16="http://schemas.microsoft.com/office/drawing/2014/main" id="{A57370D4-1067-0071-4334-529888C2C829}"/>
+                <a16:creationId xmlns:a16="http://schemas.microsoft.com/office/drawing/2014/main" xmlns="" id="{A57370D4-1067-0071-4334-529888C2C829}"/>
               </a:ext>
             </a:extLst>
           </p:cNvPr>
@@ -6776,13 +6780,20 @@
     </p:spTree>
     <p:extLst>
       <p:ext uri="{BB962C8B-B14F-4D97-AF65-F5344CB8AC3E}">
-        <p14:creationId xmlns:p14="http://schemas.microsoft.com/office/powerpoint/2010/main" val="3056204204"/>
+        <p14:creationId xmlns:p14="http://schemas.microsoft.com/office/powerpoint/2010/main" xmlns="" val="3056204204"/>
       </p:ext>
     </p:extLst>
   </p:cSld>
   <p:clrMapOvr>
     <a:masterClrMapping/>
   </p:clrMapOvr>
+  <p:timing>
+    <p:tnLst>
+      <p:par>
+        <p:cTn id="1" dur="indefinite" restart="never" nodeType="tmRoot"/>
+      </p:par>
+    </p:tnLst>
+  </p:timing>
 </p:sld>
 </file>
 
@@ -6868,7 +6879,7 @@
           <p:cNvPr id="5" name="Content Placeholder 2">
             <a:extLst>
               <a:ext uri="{FF2B5EF4-FFF2-40B4-BE49-F238E27FC236}">
-                <a16:creationId xmlns:a16="http://schemas.microsoft.com/office/drawing/2014/main" id="{22A1C46C-0F2B-62A6-587A-0349E7CF9B95}"/>
+                <a16:creationId xmlns:a16="http://schemas.microsoft.com/office/drawing/2014/main" xmlns="" id="{22A1C46C-0F2B-62A6-587A-0349E7CF9B95}"/>
               </a:ext>
             </a:extLst>
           </p:cNvPr>
@@ -6880,7 +6891,7 @@
         <p:spPr>
           <a:xfrm>
             <a:off x="604044" y="903589"/>
-            <a:ext cx="10515600" cy="5238011"/>
+            <a:ext cx="10515600" cy="5715575"/>
           </a:xfrm>
           <a:prstGeom prst="rect">
             <a:avLst/>
@@ -7154,7 +7165,26 @@
                   </a:schemeClr>
                 </a:solidFill>
               </a:rPr>
-              <a:t> CIS can exist except Idle and Codec Configures, </a:t>
+              <a:t> CIS can exist </a:t>
+            </a:r>
+            <a:r>
+              <a:rPr lang="en-US" b="1" dirty="0">
+                <a:solidFill>
+                  <a:srgbClr val="B60005"/>
+                </a:solidFill>
+              </a:rPr>
+              <a:t>except Idle and Codec Configures</a:t>
+            </a:r>
+            <a:r>
+              <a:rPr lang="en-US" b="1" dirty="0">
+                <a:solidFill>
+                  <a:schemeClr val="tx1">
+                    <a:lumMod val="65000"/>
+                    <a:lumOff val="35000"/>
+                  </a:schemeClr>
+                </a:solidFill>
+              </a:rPr>
+              <a:t>, </a:t>
             </a:r>
           </a:p>
           <a:p>
@@ -7232,15 +7262,20 @@
                   </a:schemeClr>
                 </a:solidFill>
               </a:rPr>
-              <a:t>      one Sink/Source ASE having identical </a:t>
+              <a:t>      one Sink/Source ASE having </a:t>
+            </a:r>
+            <a:r>
+              <a:rPr lang="en-US" altLang="zh-CN" b="1" dirty="0">
+                <a:solidFill>
+                  <a:srgbClr val="B60005"/>
+                </a:solidFill>
+              </a:rPr>
+              <a:t>identical </a:t>
             </a:r>
             <a:r>
               <a:rPr lang="en-US" altLang="zh-CN" b="1" dirty="0" err="1">
                 <a:solidFill>
-                  <a:schemeClr val="tx1">
-                    <a:lumMod val="65000"/>
-                    <a:lumOff val="35000"/>
-                  </a:schemeClr>
+                  <a:srgbClr val="B60005"/>
                 </a:solidFill>
               </a:rPr>
               <a:t>CIG_ID</a:t>
@@ -7248,10 +7283,7 @@
             <a:r>
               <a:rPr lang="en-US" altLang="zh-CN" b="1" dirty="0">
                 <a:solidFill>
-                  <a:schemeClr val="tx1">
-                    <a:lumMod val="65000"/>
-                    <a:lumOff val="35000"/>
-                  </a:schemeClr>
+                  <a:srgbClr val="B60005"/>
                 </a:solidFill>
               </a:rPr>
               <a:t> and </a:t>
@@ -7264,10 +7296,7 @@
             <a:r>
               <a:rPr lang="en-US" altLang="zh-CN" b="1" dirty="0">
                 <a:solidFill>
-                  <a:schemeClr val="tx1">
-                    <a:lumMod val="65000"/>
-                    <a:lumOff val="35000"/>
-                  </a:schemeClr>
+                  <a:srgbClr val="B60005"/>
                 </a:solidFill>
               </a:rPr>
               <a:t>      </a:t>
@@ -7275,10 +7304,7 @@
             <a:r>
               <a:rPr lang="en-US" altLang="zh-CN" b="1" dirty="0" err="1">
                 <a:solidFill>
-                  <a:schemeClr val="tx1">
-                    <a:lumMod val="65000"/>
-                    <a:lumOff val="35000"/>
-                  </a:schemeClr>
+                  <a:srgbClr val="B60005"/>
                 </a:solidFill>
               </a:rPr>
               <a:t>CIS_ID</a:t>
@@ -7314,7 +7340,7 @@
                   </a:schemeClr>
                 </a:solidFill>
               </a:rPr>
-              <a:t> Parameters: CIS ID, CIG ID, </a:t>
+              <a:t> Parameters: CIS ID, CIG ID, SDU </a:t>
             </a:r>
             <a:r>
               <a:rPr lang="en-US" b="1" dirty="0" err="1">
@@ -7325,7 +7351,7 @@
                   </a:schemeClr>
                 </a:solidFill>
               </a:rPr>
-              <a:t>SDU</a:t>
+              <a:t>Inertval</a:t>
             </a:r>
             <a:r>
               <a:rPr lang="en-US" b="1" dirty="0">
@@ -7336,18 +7362,53 @@
                   </a:schemeClr>
                 </a:solidFill>
               </a:rPr>
+              <a:t>, Max SDU, </a:t>
+            </a:r>
+            <a:endParaRPr lang="en-US" b="1" dirty="0" smtClean="0">
+              <a:solidFill>
+                <a:schemeClr val="tx1">
+                  <a:lumMod val="65000"/>
+                  <a:lumOff val="35000"/>
+                </a:schemeClr>
+              </a:solidFill>
+            </a:endParaRPr>
+          </a:p>
+          <a:p>
+            <a:pPr lvl="1">
+              <a:buNone/>
+            </a:pPr>
+            <a:r>
+              <a:rPr lang="en-US" b="1" dirty="0" smtClean="0">
+                <a:solidFill>
+                  <a:schemeClr val="tx1">
+                    <a:lumMod val="65000"/>
+                    <a:lumOff val="35000"/>
+                  </a:schemeClr>
+                </a:solidFill>
+              </a:rPr>
               <a:t> </a:t>
             </a:r>
             <a:r>
-              <a:rPr lang="en-US" b="1" dirty="0" err="1">
-                <a:solidFill>
-                  <a:schemeClr val="tx1">
-                    <a:lumMod val="65000"/>
-                    <a:lumOff val="35000"/>
-                  </a:schemeClr>
-                </a:solidFill>
-              </a:rPr>
-              <a:t>Inertval</a:t>
+              <a:rPr lang="en-US" b="1" dirty="0" smtClean="0">
+                <a:solidFill>
+                  <a:schemeClr val="tx1">
+                    <a:lumMod val="65000"/>
+                    <a:lumOff val="35000"/>
+                  </a:schemeClr>
+                </a:solidFill>
+              </a:rPr>
+              <a:t>     </a:t>
+            </a:r>
+            <a:r>
+              <a:rPr lang="en-US" b="1" dirty="0" smtClean="0">
+                <a:solidFill>
+                  <a:schemeClr val="tx1">
+                    <a:lumMod val="65000"/>
+                    <a:lumOff val="35000"/>
+                  </a:schemeClr>
+                </a:solidFill>
+              </a:rPr>
+              <a:t>Retransmission </a:t>
             </a:r>
             <a:r>
               <a:rPr lang="en-US" b="1" dirty="0">
@@ -7358,18 +7419,56 @@
                   </a:schemeClr>
                 </a:solidFill>
               </a:rPr>
-              <a:t>, Max </a:t>
-            </a:r>
-            <a:r>
-              <a:rPr lang="en-US" b="1" dirty="0" err="1">
-                <a:solidFill>
-                  <a:schemeClr val="tx1">
-                    <a:lumMod val="65000"/>
-                    <a:lumOff val="35000"/>
-                  </a:schemeClr>
-                </a:solidFill>
-              </a:rPr>
-              <a:t>SDU</a:t>
+              <a:t>Number, Max Transport Latency</a:t>
+            </a:r>
+            <a:r>
+              <a:rPr lang="en-US" b="1" dirty="0" smtClean="0">
+                <a:solidFill>
+                  <a:schemeClr val="tx1">
+                    <a:lumMod val="65000"/>
+                    <a:lumOff val="35000"/>
+                  </a:schemeClr>
+                </a:solidFill>
+              </a:rPr>
+              <a:t>,</a:t>
+            </a:r>
+          </a:p>
+          <a:p>
+            <a:pPr lvl="1">
+              <a:buNone/>
+            </a:pPr>
+            <a:r>
+              <a:rPr lang="en-US" b="1" dirty="0" smtClean="0">
+                <a:solidFill>
+                  <a:schemeClr val="tx1">
+                    <a:lumMod val="65000"/>
+                    <a:lumOff val="35000"/>
+                  </a:schemeClr>
+                </a:solidFill>
+              </a:rPr>
+              <a:t> </a:t>
+            </a:r>
+            <a:r>
+              <a:rPr lang="en-US" b="1" dirty="0" smtClean="0">
+                <a:solidFill>
+                  <a:schemeClr val="tx1">
+                    <a:lumMod val="65000"/>
+                    <a:lumOff val="35000"/>
+                  </a:schemeClr>
+                </a:solidFill>
+              </a:rPr>
+              <a:t>   </a:t>
+            </a:r>
+            <a:r>
+              <a:rPr lang="en-US" b="1" dirty="0" smtClean="0">
+                <a:solidFill>
+                  <a:schemeClr val="tx1">
+                    <a:lumMod val="65000"/>
+                    <a:lumOff val="35000"/>
+                  </a:schemeClr>
+                </a:solidFill>
+              </a:rPr>
+              <a:t> </a:t>
             </a:r>
             <a:r>
               <a:rPr lang="en-US" b="1" dirty="0">
@@ -7380,7 +7479,7 @@
                   </a:schemeClr>
                 </a:solidFill>
               </a:rPr>
-              <a:t>, Retransmission Number, Max Transport Latency, Presentation Delay</a:t>
+              <a:t>Presentation Delay</a:t>
             </a:r>
           </a:p>
         </p:txBody>
@@ -7390,7 +7489,7 @@
           <p:cNvPr id="4" name="图片 3">
             <a:extLst>
               <a:ext uri="{FF2B5EF4-FFF2-40B4-BE49-F238E27FC236}">
-                <a16:creationId xmlns:a16="http://schemas.microsoft.com/office/drawing/2014/main" id="{199B4F04-F086-14CC-5C46-554836F4A0AA}"/>
+                <a16:creationId xmlns:a16="http://schemas.microsoft.com/office/drawing/2014/main" xmlns="" id="{199B4F04-F086-14CC-5C46-554836F4A0AA}"/>
               </a:ext>
             </a:extLst>
           </p:cNvPr>
@@ -7400,10 +7499,10 @@
           <p:nvPr/>
         </p:nvPicPr>
         <p:blipFill>
-          <a:blip r:embed="rId3">
+          <a:blip r:embed="rId3" cstate="print">
             <a:extLst>
               <a:ext uri="{28A0092B-C50C-407E-A947-70E740481C1C}">
-                <a14:useLocalDpi xmlns:a14="http://schemas.microsoft.com/office/drawing/2010/main" val="0"/>
+                <a14:useLocalDpi xmlns:a14="http://schemas.microsoft.com/office/drawing/2010/main" xmlns="" val="0"/>
               </a:ext>
             </a:extLst>
           </a:blip>
@@ -7426,7 +7525,7 @@
           <p:cNvPr id="7" name="图片 6">
             <a:extLst>
               <a:ext uri="{FF2B5EF4-FFF2-40B4-BE49-F238E27FC236}">
-                <a16:creationId xmlns:a16="http://schemas.microsoft.com/office/drawing/2014/main" id="{96D4468D-3D3F-E4AF-02C2-32F309D3FD37}"/>
+                <a16:creationId xmlns:a16="http://schemas.microsoft.com/office/drawing/2014/main" xmlns="" id="{96D4468D-3D3F-E4AF-02C2-32F309D3FD37}"/>
               </a:ext>
             </a:extLst>
           </p:cNvPr>
@@ -7436,10 +7535,10 @@
           <p:nvPr/>
         </p:nvPicPr>
         <p:blipFill>
-          <a:blip r:embed="rId4">
+          <a:blip r:embed="rId4" cstate="print">
             <a:extLst>
               <a:ext uri="{28A0092B-C50C-407E-A947-70E740481C1C}">
-                <a14:useLocalDpi xmlns:a14="http://schemas.microsoft.com/office/drawing/2010/main" val="0"/>
+                <a14:useLocalDpi xmlns:a14="http://schemas.microsoft.com/office/drawing/2010/main" xmlns="" val="0"/>
               </a:ext>
             </a:extLst>
           </a:blip>
@@ -7462,7 +7561,7 @@
           <p:cNvPr id="9" name="文本框 8">
             <a:extLst>
               <a:ext uri="{FF2B5EF4-FFF2-40B4-BE49-F238E27FC236}">
-                <a16:creationId xmlns:a16="http://schemas.microsoft.com/office/drawing/2014/main" id="{7A08B3C2-8665-B1F9-8F5F-3B449C3CB726}"/>
+                <a16:creationId xmlns:a16="http://schemas.microsoft.com/office/drawing/2014/main" xmlns="" id="{7A08B3C2-8665-B1F9-8F5F-3B449C3CB726}"/>
               </a:ext>
             </a:extLst>
           </p:cNvPr>
@@ -7505,7 +7604,7 @@
           <p:cNvPr id="10" name="文本框 9">
             <a:extLst>
               <a:ext uri="{FF2B5EF4-FFF2-40B4-BE49-F238E27FC236}">
-                <a16:creationId xmlns:a16="http://schemas.microsoft.com/office/drawing/2014/main" id="{942E3CDF-9730-903D-A04B-F24C99A058FE}"/>
+                <a16:creationId xmlns:a16="http://schemas.microsoft.com/office/drawing/2014/main" xmlns="" id="{942E3CDF-9730-903D-A04B-F24C99A058FE}"/>
               </a:ext>
             </a:extLst>
           </p:cNvPr>
@@ -7546,13 +7645,20 @@
     </p:spTree>
     <p:extLst>
       <p:ext uri="{BB962C8B-B14F-4D97-AF65-F5344CB8AC3E}">
-        <p14:creationId xmlns:p14="http://schemas.microsoft.com/office/powerpoint/2010/main" val="4090093851"/>
+        <p14:creationId xmlns:p14="http://schemas.microsoft.com/office/powerpoint/2010/main" xmlns="" val="4090093851"/>
       </p:ext>
     </p:extLst>
   </p:cSld>
   <p:clrMapOvr>
     <a:masterClrMapping/>
   </p:clrMapOvr>
+  <p:timing>
+    <p:tnLst>
+      <p:par>
+        <p:cTn id="1" dur="indefinite" restart="never" nodeType="tmRoot"/>
+      </p:par>
+    </p:tnLst>
+  </p:timing>
 </p:sld>
 </file>
 
@@ -7638,7 +7744,7 @@
           <p:cNvPr id="5" name="Content Placeholder 2">
             <a:extLst>
               <a:ext uri="{FF2B5EF4-FFF2-40B4-BE49-F238E27FC236}">
-                <a16:creationId xmlns:a16="http://schemas.microsoft.com/office/drawing/2014/main" id="{22A1C46C-0F2B-62A6-587A-0349E7CF9B95}"/>
+                <a16:creationId xmlns:a16="http://schemas.microsoft.com/office/drawing/2014/main" xmlns="" id="{22A1C46C-0F2B-62A6-587A-0349E7CF9B95}"/>
               </a:ext>
             </a:extLst>
           </p:cNvPr>
@@ -7975,7 +8081,26 @@
                   </a:schemeClr>
                 </a:solidFill>
               </a:rPr>
-              <a:t>     acting as Audio Sink for the ASE, and if the server </a:t>
+              <a:t>     acting as </a:t>
+            </a:r>
+            <a:r>
+              <a:rPr lang="en-US" b="1" dirty="0">
+                <a:solidFill>
+                  <a:srgbClr val="B60005"/>
+                </a:solidFill>
+              </a:rPr>
+              <a:t>Audio Sink </a:t>
+            </a:r>
+            <a:r>
+              <a:rPr lang="en-US" b="1" dirty="0">
+                <a:solidFill>
+                  <a:schemeClr val="tx1">
+                    <a:lumMod val="65000"/>
+                    <a:lumOff val="35000"/>
+                  </a:schemeClr>
+                </a:solidFill>
+              </a:rPr>
+              <a:t>for the ASE, and if the server </a:t>
             </a:r>
           </a:p>
           <a:p>
@@ -8007,7 +8132,26 @@
                   </a:schemeClr>
                 </a:solidFill>
               </a:rPr>
-              <a:t>     client, the server may autonomously initiate the </a:t>
+              <a:t>     client, the server may </a:t>
+            </a:r>
+            <a:r>
+              <a:rPr lang="en-US" b="1" dirty="0">
+                <a:solidFill>
+                  <a:srgbClr val="B60005"/>
+                </a:solidFill>
+              </a:rPr>
+              <a:t>autonomously</a:t>
+            </a:r>
+            <a:r>
+              <a:rPr lang="en-US" b="1" dirty="0">
+                <a:solidFill>
+                  <a:schemeClr val="tx1">
+                    <a:lumMod val="65000"/>
+                    <a:lumOff val="35000"/>
+                  </a:schemeClr>
+                </a:solidFill>
+              </a:rPr>
+              <a:t> initiate the </a:t>
             </a:r>
           </a:p>
           <a:p>
@@ -8065,7 +8209,7 @@
           <p:cNvPr id="4" name="图片 3">
             <a:extLst>
               <a:ext uri="{FF2B5EF4-FFF2-40B4-BE49-F238E27FC236}">
-                <a16:creationId xmlns:a16="http://schemas.microsoft.com/office/drawing/2014/main" id="{6DA5B60B-56FA-8022-157A-3B2D7BFE2A12}"/>
+                <a16:creationId xmlns:a16="http://schemas.microsoft.com/office/drawing/2014/main" xmlns="" id="{6DA5B60B-56FA-8022-157A-3B2D7BFE2A12}"/>
               </a:ext>
             </a:extLst>
           </p:cNvPr>
@@ -8075,10 +8219,10 @@
           <p:nvPr/>
         </p:nvPicPr>
         <p:blipFill>
-          <a:blip r:embed="rId3">
+          <a:blip r:embed="rId3" cstate="print">
             <a:extLst>
               <a:ext uri="{28A0092B-C50C-407E-A947-70E740481C1C}">
-                <a14:useLocalDpi xmlns:a14="http://schemas.microsoft.com/office/drawing/2010/main" val="0"/>
+                <a14:useLocalDpi xmlns:a14="http://schemas.microsoft.com/office/drawing/2010/main" xmlns="" val="0"/>
               </a:ext>
             </a:extLst>
           </a:blip>
@@ -8101,7 +8245,7 @@
           <p:cNvPr id="7" name="图片 6">
             <a:extLst>
               <a:ext uri="{FF2B5EF4-FFF2-40B4-BE49-F238E27FC236}">
-                <a16:creationId xmlns:a16="http://schemas.microsoft.com/office/drawing/2014/main" id="{3A04F159-9C38-D769-0837-EF7D4119DF98}"/>
+                <a16:creationId xmlns:a16="http://schemas.microsoft.com/office/drawing/2014/main" xmlns="" id="{3A04F159-9C38-D769-0837-EF7D4119DF98}"/>
               </a:ext>
             </a:extLst>
           </p:cNvPr>
@@ -8111,10 +8255,10 @@
           <p:nvPr/>
         </p:nvPicPr>
         <p:blipFill>
-          <a:blip r:embed="rId4">
+          <a:blip r:embed="rId4" cstate="print">
             <a:extLst>
               <a:ext uri="{28A0092B-C50C-407E-A947-70E740481C1C}">
-                <a14:useLocalDpi xmlns:a14="http://schemas.microsoft.com/office/drawing/2010/main" val="0"/>
+                <a14:useLocalDpi xmlns:a14="http://schemas.microsoft.com/office/drawing/2010/main" xmlns="" val="0"/>
               </a:ext>
             </a:extLst>
           </a:blip>
@@ -8137,7 +8281,7 @@
           <p:cNvPr id="9" name="文本框 8">
             <a:extLst>
               <a:ext uri="{FF2B5EF4-FFF2-40B4-BE49-F238E27FC236}">
-                <a16:creationId xmlns:a16="http://schemas.microsoft.com/office/drawing/2014/main" id="{DB2B70AA-413D-71AC-E231-E48E938BE39A}"/>
+                <a16:creationId xmlns:a16="http://schemas.microsoft.com/office/drawing/2014/main" xmlns="" id="{DB2B70AA-413D-71AC-E231-E48E938BE39A}"/>
               </a:ext>
             </a:extLst>
           </p:cNvPr>
@@ -8180,7 +8324,7 @@
           <p:cNvPr id="10" name="文本框 9">
             <a:extLst>
               <a:ext uri="{FF2B5EF4-FFF2-40B4-BE49-F238E27FC236}">
-                <a16:creationId xmlns:a16="http://schemas.microsoft.com/office/drawing/2014/main" id="{3C121D12-248A-6A20-387A-C12FF25FFB7C}"/>
+                <a16:creationId xmlns:a16="http://schemas.microsoft.com/office/drawing/2014/main" xmlns="" id="{3C121D12-248A-6A20-387A-C12FF25FFB7C}"/>
               </a:ext>
             </a:extLst>
           </p:cNvPr>
@@ -8221,13 +8365,20 @@
     </p:spTree>
     <p:extLst>
       <p:ext uri="{BB962C8B-B14F-4D97-AF65-F5344CB8AC3E}">
-        <p14:creationId xmlns:p14="http://schemas.microsoft.com/office/powerpoint/2010/main" val="1667499453"/>
+        <p14:creationId xmlns:p14="http://schemas.microsoft.com/office/powerpoint/2010/main" xmlns="" val="1667499453"/>
       </p:ext>
     </p:extLst>
   </p:cSld>
   <p:clrMapOvr>
     <a:masterClrMapping/>
   </p:clrMapOvr>
+  <p:timing>
+    <p:tnLst>
+      <p:par>
+        <p:cTn id="1" dur="indefinite" restart="never" nodeType="tmRoot"/>
+      </p:par>
+    </p:tnLst>
+  </p:timing>
 </p:sld>
 </file>
 
@@ -8313,7 +8464,7 @@
           <p:cNvPr id="5" name="Content Placeholder 2">
             <a:extLst>
               <a:ext uri="{FF2B5EF4-FFF2-40B4-BE49-F238E27FC236}">
-                <a16:creationId xmlns:a16="http://schemas.microsoft.com/office/drawing/2014/main" id="{22A1C46C-0F2B-62A6-587A-0349E7CF9B95}"/>
+                <a16:creationId xmlns:a16="http://schemas.microsoft.com/office/drawing/2014/main" xmlns="" id="{22A1C46C-0F2B-62A6-587A-0349E7CF9B95}"/>
               </a:ext>
             </a:extLst>
           </p:cNvPr>
@@ -8721,7 +8872,7 @@
           <p:cNvPr id="4" name="图片 3">
             <a:extLst>
               <a:ext uri="{FF2B5EF4-FFF2-40B4-BE49-F238E27FC236}">
-                <a16:creationId xmlns:a16="http://schemas.microsoft.com/office/drawing/2014/main" id="{397AE7BC-23DE-0B91-4D0B-4E42751FA92B}"/>
+                <a16:creationId xmlns:a16="http://schemas.microsoft.com/office/drawing/2014/main" xmlns="" id="{397AE7BC-23DE-0B91-4D0B-4E42751FA92B}"/>
               </a:ext>
             </a:extLst>
           </p:cNvPr>
@@ -8731,10 +8882,10 @@
           <p:nvPr/>
         </p:nvPicPr>
         <p:blipFill>
-          <a:blip r:embed="rId3">
+          <a:blip r:embed="rId3" cstate="print">
             <a:extLst>
               <a:ext uri="{28A0092B-C50C-407E-A947-70E740481C1C}">
-                <a14:useLocalDpi xmlns:a14="http://schemas.microsoft.com/office/drawing/2010/main" val="0"/>
+                <a14:useLocalDpi xmlns:a14="http://schemas.microsoft.com/office/drawing/2010/main" xmlns="" val="0"/>
               </a:ext>
             </a:extLst>
           </a:blip>
@@ -8757,7 +8908,7 @@
           <p:cNvPr id="7" name="图片 6">
             <a:extLst>
               <a:ext uri="{FF2B5EF4-FFF2-40B4-BE49-F238E27FC236}">
-                <a16:creationId xmlns:a16="http://schemas.microsoft.com/office/drawing/2014/main" id="{1D0FAD9E-BABD-74E0-3695-E2E0313F798E}"/>
+                <a16:creationId xmlns:a16="http://schemas.microsoft.com/office/drawing/2014/main" xmlns="" id="{1D0FAD9E-BABD-74E0-3695-E2E0313F798E}"/>
               </a:ext>
             </a:extLst>
           </p:cNvPr>
@@ -8767,10 +8918,10 @@
           <p:nvPr/>
         </p:nvPicPr>
         <p:blipFill>
-          <a:blip r:embed="rId4">
+          <a:blip r:embed="rId4" cstate="print">
             <a:extLst>
               <a:ext uri="{28A0092B-C50C-407E-A947-70E740481C1C}">
-                <a14:useLocalDpi xmlns:a14="http://schemas.microsoft.com/office/drawing/2010/main" val="0"/>
+                <a14:useLocalDpi xmlns:a14="http://schemas.microsoft.com/office/drawing/2010/main" xmlns="" val="0"/>
               </a:ext>
             </a:extLst>
           </a:blip>
@@ -8793,7 +8944,7 @@
           <p:cNvPr id="9" name="文本框 8">
             <a:extLst>
               <a:ext uri="{FF2B5EF4-FFF2-40B4-BE49-F238E27FC236}">
-                <a16:creationId xmlns:a16="http://schemas.microsoft.com/office/drawing/2014/main" id="{31574931-297E-57BF-01DA-87B54C71F250}"/>
+                <a16:creationId xmlns:a16="http://schemas.microsoft.com/office/drawing/2014/main" xmlns="" id="{31574931-297E-57BF-01DA-87B54C71F250}"/>
               </a:ext>
             </a:extLst>
           </p:cNvPr>
@@ -8836,7 +8987,7 @@
           <p:cNvPr id="10" name="文本框 9">
             <a:extLst>
               <a:ext uri="{FF2B5EF4-FFF2-40B4-BE49-F238E27FC236}">
-                <a16:creationId xmlns:a16="http://schemas.microsoft.com/office/drawing/2014/main" id="{CB3B5934-7680-16A9-1649-4CDF905FF939}"/>
+                <a16:creationId xmlns:a16="http://schemas.microsoft.com/office/drawing/2014/main" xmlns="" id="{CB3B5934-7680-16A9-1649-4CDF905FF939}"/>
               </a:ext>
             </a:extLst>
           </p:cNvPr>
@@ -8877,13 +9028,20 @@
     </p:spTree>
     <p:extLst>
       <p:ext uri="{BB962C8B-B14F-4D97-AF65-F5344CB8AC3E}">
-        <p14:creationId xmlns:p14="http://schemas.microsoft.com/office/powerpoint/2010/main" val="740345499"/>
+        <p14:creationId xmlns:p14="http://schemas.microsoft.com/office/powerpoint/2010/main" xmlns="" val="740345499"/>
       </p:ext>
     </p:extLst>
   </p:cSld>
   <p:clrMapOvr>
     <a:masterClrMapping/>
   </p:clrMapOvr>
+  <p:timing>
+    <p:tnLst>
+      <p:par>
+        <p:cTn id="1" dur="indefinite" restart="never" nodeType="tmRoot"/>
+      </p:par>
+    </p:tnLst>
+  </p:timing>
 </p:sld>
 </file>
 
@@ -8969,7 +9127,7 @@
           <p:cNvPr id="5" name="Content Placeholder 2">
             <a:extLst>
               <a:ext uri="{FF2B5EF4-FFF2-40B4-BE49-F238E27FC236}">
-                <a16:creationId xmlns:a16="http://schemas.microsoft.com/office/drawing/2014/main" id="{22A1C46C-0F2B-62A6-587A-0349E7CF9B95}"/>
+                <a16:creationId xmlns:a16="http://schemas.microsoft.com/office/drawing/2014/main" xmlns="" id="{22A1C46C-0F2B-62A6-587A-0349E7CF9B95}"/>
               </a:ext>
             </a:extLst>
           </p:cNvPr>
@@ -9195,139 +9353,25 @@
                   </a:schemeClr>
                 </a:solidFill>
               </a:rPr>
-              <a:t> Released</a:t>
+              <a:t> </a:t>
+            </a:r>
+            <a:r>
+              <a:rPr lang="en-US" altLang="zh-CN" dirty="0" smtClean="0"/>
+              <a:t> Release</a:t>
             </a:r>
           </a:p>
           <a:p>
             <a:pPr lvl="1"/>
             <a:r>
-              <a:rPr lang="en-US" altLang="zh-CN" b="1" dirty="0">
-                <a:solidFill>
-                  <a:schemeClr val="tx1">
-                    <a:lumMod val="65000"/>
-                    <a:lumOff val="35000"/>
-                  </a:schemeClr>
-                </a:solidFill>
-              </a:rPr>
-              <a:t> I</a:t>
-            </a:r>
-            <a:r>
-              <a:rPr lang="en-US" b="1" dirty="0">
-                <a:solidFill>
-                  <a:schemeClr val="tx1">
-                    <a:lumMod val="65000"/>
-                    <a:lumOff val="35000"/>
-                  </a:schemeClr>
-                </a:solidFill>
-              </a:rPr>
-              <a:t>nitiated autonomously by the server if:</a:t>
-            </a:r>
-          </a:p>
-          <a:p>
-            <a:pPr lvl="2"/>
-            <a:r>
-              <a:rPr lang="en-US" b="1" dirty="0">
-                <a:solidFill>
-                  <a:schemeClr val="tx1">
-                    <a:lumMod val="65000"/>
-                    <a:lumOff val="35000"/>
-                  </a:schemeClr>
-                </a:solidFill>
-              </a:rPr>
-              <a:t>The server has detected the loss of the LE-ACL for </a:t>
-            </a:r>
-          </a:p>
-          <a:p>
-            <a:pPr marL="914400" lvl="2" indent="0">
-              <a:buNone/>
-            </a:pPr>
-            <a:r>
-              <a:rPr lang="en-US" b="1" dirty="0">
-                <a:solidFill>
-                  <a:schemeClr val="tx1">
-                    <a:lumMod val="65000"/>
-                    <a:lumOff val="35000"/>
-                  </a:schemeClr>
-                </a:solidFill>
-              </a:rPr>
-              <a:t>    an ASE in any state, or</a:t>
-            </a:r>
-            <a:r>
-              <a:rPr lang="en-US" dirty="0">
-                <a:solidFill>
-                  <a:schemeClr val="tx1">
-                    <a:lumMod val="65000"/>
-                    <a:lumOff val="35000"/>
-                  </a:schemeClr>
-                </a:solidFill>
-              </a:rPr>
-              <a:t> </a:t>
-            </a:r>
-          </a:p>
-          <a:p>
-            <a:pPr lvl="2"/>
-            <a:r>
-              <a:rPr lang="en-US" b="1" dirty="0">
-                <a:solidFill>
-                  <a:schemeClr val="tx1">
-                    <a:lumMod val="65000"/>
-                    <a:lumOff val="35000"/>
-                  </a:schemeClr>
-                </a:solidFill>
-              </a:rPr>
-              <a:t>Release have completed, and the server controller </a:t>
-            </a:r>
-          </a:p>
-          <a:p>
-            <a:pPr marL="914400" lvl="2" indent="0">
-              <a:buNone/>
-            </a:pPr>
-            <a:r>
-              <a:rPr lang="en-US" b="1" dirty="0">
-                <a:solidFill>
-                  <a:schemeClr val="tx1">
-                    <a:lumMod val="65000"/>
-                    <a:lumOff val="35000"/>
-                  </a:schemeClr>
-                </a:solidFill>
-              </a:rPr>
-              <a:t>    has indicated that CIS has been torn down</a:t>
-            </a:r>
-            <a:r>
-              <a:rPr lang="en-US" dirty="0">
-                <a:solidFill>
-                  <a:schemeClr val="tx1">
-                    <a:lumMod val="65000"/>
-                    <a:lumOff val="35000"/>
-                  </a:schemeClr>
-                </a:solidFill>
-              </a:rPr>
-              <a:t>	</a:t>
-            </a:r>
-          </a:p>
-          <a:p>
-            <a:pPr lvl="1"/>
-            <a:r>
-              <a:rPr lang="en-US" dirty="0">
-                <a:solidFill>
-                  <a:schemeClr val="tx1">
-                    <a:lumMod val="65000"/>
-                    <a:lumOff val="35000"/>
-                  </a:schemeClr>
-                </a:solidFill>
-              </a:rPr>
-              <a:t> </a:t>
-            </a:r>
-            <a:r>
-              <a:rPr lang="en-US" b="1" dirty="0">
-                <a:solidFill>
-                  <a:schemeClr val="tx1">
-                    <a:lumMod val="65000"/>
-                    <a:lumOff val="35000"/>
-                  </a:schemeClr>
-                </a:solidFill>
-              </a:rPr>
-              <a:t>Server can choose to cache a codec configuration</a:t>
+              <a:rPr lang="en-US" altLang="zh-CN" sz="2100" b="1" dirty="0" smtClean="0">
+                <a:solidFill>
+                  <a:schemeClr val="tx1">
+                    <a:lumMod val="65000"/>
+                    <a:lumOff val="35000"/>
+                  </a:schemeClr>
+                </a:solidFill>
+              </a:rPr>
+              <a:t> Request the server to release an ASE and all resources </a:t>
             </a:r>
           </a:p>
           <a:p>
@@ -9335,54 +9379,7 @@
               <a:buNone/>
             </a:pPr>
             <a:r>
-              <a:rPr lang="en-US" b="1" dirty="0">
-                <a:solidFill>
-                  <a:schemeClr val="tx1">
-                    <a:lumMod val="65000"/>
-                    <a:lumOff val="35000"/>
-                  </a:schemeClr>
-                </a:solidFill>
-              </a:rPr>
-              <a:t>     or not cache codec configuration</a:t>
-            </a:r>
-          </a:p>
-          <a:p>
-            <a:r>
-              <a:rPr lang="en-US" dirty="0">
-                <a:solidFill>
-                  <a:schemeClr val="tx1">
-                    <a:lumMod val="65000"/>
-                    <a:lumOff val="35000"/>
-                  </a:schemeClr>
-                </a:solidFill>
-              </a:rPr>
-              <a:t> </a:t>
-            </a:r>
-            <a:r>
-              <a:rPr lang="en-US" altLang="zh-CN" dirty="0"/>
-              <a:t>Release</a:t>
-            </a:r>
-          </a:p>
-          <a:p>
-            <a:pPr lvl="1"/>
-            <a:r>
-              <a:rPr lang="en-US" altLang="zh-CN" sz="2100" b="1" dirty="0">
-                <a:solidFill>
-                  <a:schemeClr val="tx1">
-                    <a:lumMod val="65000"/>
-                    <a:lumOff val="35000"/>
-                  </a:schemeClr>
-                </a:solidFill>
-              </a:rPr>
-              <a:t> Request the server to release an ASE and all resources </a:t>
-            </a:r>
-          </a:p>
-          <a:p>
-            <a:pPr marL="457200" lvl="1" indent="0">
-              <a:buNone/>
-            </a:pPr>
-            <a:r>
-              <a:rPr lang="en-US" altLang="zh-CN" sz="2100" b="1" dirty="0">
+              <a:rPr lang="en-US" altLang="zh-CN" sz="2100" b="1" dirty="0" smtClean="0">
                 <a:solidFill>
                   <a:schemeClr val="tx1">
                     <a:lumMod val="65000"/>
@@ -9392,7 +9389,20 @@
               </a:rPr>
               <a:t>    associated with that ASE.</a:t>
             </a:r>
-            <a:endParaRPr lang="en-US" sz="2100" b="1" dirty="0">
+          </a:p>
+          <a:p>
+            <a:r>
+              <a:rPr lang="en-US" sz="2200" dirty="0" smtClean="0">
+                <a:solidFill>
+                  <a:schemeClr val="tx1">
+                    <a:lumMod val="65000"/>
+                    <a:lumOff val="35000"/>
+                  </a:schemeClr>
+                </a:solidFill>
+              </a:rPr>
+              <a:t>Released</a:t>
+            </a:r>
+            <a:endParaRPr lang="en-US" sz="2200" dirty="0">
               <a:solidFill>
                 <a:schemeClr val="tx1">
                   <a:lumMod val="65000"/>
@@ -9401,6 +9411,173 @@
               </a:solidFill>
             </a:endParaRPr>
           </a:p>
+          <a:p>
+            <a:pPr lvl="1"/>
+            <a:r>
+              <a:rPr lang="en-US" altLang="zh-CN" b="1" dirty="0">
+                <a:solidFill>
+                  <a:schemeClr val="tx1">
+                    <a:lumMod val="65000"/>
+                    <a:lumOff val="35000"/>
+                  </a:schemeClr>
+                </a:solidFill>
+              </a:rPr>
+              <a:t> I</a:t>
+            </a:r>
+            <a:r>
+              <a:rPr lang="en-US" b="1" dirty="0">
+                <a:solidFill>
+                  <a:schemeClr val="tx1">
+                    <a:lumMod val="65000"/>
+                    <a:lumOff val="35000"/>
+                  </a:schemeClr>
+                </a:solidFill>
+              </a:rPr>
+              <a:t>nitiated autonomously by the server if:</a:t>
+            </a:r>
+          </a:p>
+          <a:p>
+            <a:pPr lvl="2"/>
+            <a:r>
+              <a:rPr lang="en-US" b="1" dirty="0">
+                <a:solidFill>
+                  <a:schemeClr val="tx1">
+                    <a:lumMod val="65000"/>
+                    <a:lumOff val="35000"/>
+                  </a:schemeClr>
+                </a:solidFill>
+              </a:rPr>
+              <a:t>The server has detected the loss of the LE-ACL for </a:t>
+            </a:r>
+          </a:p>
+          <a:p>
+            <a:pPr marL="914400" lvl="2" indent="0">
+              <a:buNone/>
+            </a:pPr>
+            <a:r>
+              <a:rPr lang="en-US" b="1" dirty="0">
+                <a:solidFill>
+                  <a:schemeClr val="tx1">
+                    <a:lumMod val="65000"/>
+                    <a:lumOff val="35000"/>
+                  </a:schemeClr>
+                </a:solidFill>
+              </a:rPr>
+              <a:t>    an ASE in any state, or</a:t>
+            </a:r>
+            <a:r>
+              <a:rPr lang="en-US" dirty="0">
+                <a:solidFill>
+                  <a:schemeClr val="tx1">
+                    <a:lumMod val="65000"/>
+                    <a:lumOff val="35000"/>
+                  </a:schemeClr>
+                </a:solidFill>
+              </a:rPr>
+              <a:t> </a:t>
+            </a:r>
+          </a:p>
+          <a:p>
+            <a:pPr lvl="2"/>
+            <a:r>
+              <a:rPr lang="en-US" b="1" dirty="0">
+                <a:solidFill>
+                  <a:schemeClr val="tx1">
+                    <a:lumMod val="65000"/>
+                    <a:lumOff val="35000"/>
+                  </a:schemeClr>
+                </a:solidFill>
+              </a:rPr>
+              <a:t>Release have completed, and the server controller </a:t>
+            </a:r>
+          </a:p>
+          <a:p>
+            <a:pPr marL="914400" lvl="2" indent="0">
+              <a:buNone/>
+            </a:pPr>
+            <a:r>
+              <a:rPr lang="en-US" b="1" dirty="0">
+                <a:solidFill>
+                  <a:schemeClr val="tx1">
+                    <a:lumMod val="65000"/>
+                    <a:lumOff val="35000"/>
+                  </a:schemeClr>
+                </a:solidFill>
+              </a:rPr>
+              <a:t>    has indicated that CIS has been torn down</a:t>
+            </a:r>
+            <a:r>
+              <a:rPr lang="en-US" dirty="0">
+                <a:solidFill>
+                  <a:schemeClr val="tx1">
+                    <a:lumMod val="65000"/>
+                    <a:lumOff val="35000"/>
+                  </a:schemeClr>
+                </a:solidFill>
+              </a:rPr>
+              <a:t>	</a:t>
+            </a:r>
+          </a:p>
+          <a:p>
+            <a:pPr lvl="1"/>
+            <a:r>
+              <a:rPr lang="en-US" dirty="0">
+                <a:solidFill>
+                  <a:schemeClr val="tx1">
+                    <a:lumMod val="65000"/>
+                    <a:lumOff val="35000"/>
+                  </a:schemeClr>
+                </a:solidFill>
+              </a:rPr>
+              <a:t> </a:t>
+            </a:r>
+            <a:r>
+              <a:rPr lang="en-US" b="1" dirty="0">
+                <a:solidFill>
+                  <a:schemeClr val="tx1">
+                    <a:lumMod val="65000"/>
+                    <a:lumOff val="35000"/>
+                  </a:schemeClr>
+                </a:solidFill>
+              </a:rPr>
+              <a:t>Server can choose to cache a codec configuration</a:t>
+            </a:r>
+          </a:p>
+          <a:p>
+            <a:pPr marL="457200" lvl="1" indent="0">
+              <a:buNone/>
+            </a:pPr>
+            <a:r>
+              <a:rPr lang="en-US" b="1" dirty="0">
+                <a:solidFill>
+                  <a:schemeClr val="tx1">
+                    <a:lumMod val="65000"/>
+                    <a:lumOff val="35000"/>
+                  </a:schemeClr>
+                </a:solidFill>
+              </a:rPr>
+              <a:t>     or not cache codec </a:t>
+            </a:r>
+            <a:r>
+              <a:rPr lang="en-US" b="1" dirty="0" smtClean="0">
+                <a:solidFill>
+                  <a:schemeClr val="tx1">
+                    <a:lumMod val="65000"/>
+                    <a:lumOff val="35000"/>
+                  </a:schemeClr>
+                </a:solidFill>
+              </a:rPr>
+              <a:t>configuration</a:t>
+            </a:r>
+            <a:endParaRPr lang="en-US" b="1" dirty="0">
+              <a:solidFill>
+                <a:schemeClr val="tx1">
+                  <a:lumMod val="65000"/>
+                  <a:lumOff val="35000"/>
+                </a:schemeClr>
+              </a:solidFill>
+            </a:endParaRPr>
+          </a:p>
         </p:txBody>
       </p:sp>
       <p:pic>
@@ -9408,7 +9585,7 @@
           <p:cNvPr id="6" name="图片 5">
             <a:extLst>
               <a:ext uri="{FF2B5EF4-FFF2-40B4-BE49-F238E27FC236}">
-                <a16:creationId xmlns:a16="http://schemas.microsoft.com/office/drawing/2014/main" id="{1F5C1036-80A0-51FC-C0BC-57170F7B3F12}"/>
+                <a16:creationId xmlns:a16="http://schemas.microsoft.com/office/drawing/2014/main" xmlns="" id="{1F5C1036-80A0-51FC-C0BC-57170F7B3F12}"/>
               </a:ext>
             </a:extLst>
           </p:cNvPr>
@@ -9418,10 +9595,10 @@
           <p:nvPr/>
         </p:nvPicPr>
         <p:blipFill>
-          <a:blip r:embed="rId3">
+          <a:blip r:embed="rId3" cstate="print">
             <a:extLst>
               <a:ext uri="{28A0092B-C50C-407E-A947-70E740481C1C}">
-                <a14:useLocalDpi xmlns:a14="http://schemas.microsoft.com/office/drawing/2010/main" val="0"/>
+                <a14:useLocalDpi xmlns:a14="http://schemas.microsoft.com/office/drawing/2010/main" xmlns="" val="0"/>
               </a:ext>
             </a:extLst>
           </a:blip>
@@ -9444,7 +9621,7 @@
           <p:cNvPr id="8" name="图片 7">
             <a:extLst>
               <a:ext uri="{FF2B5EF4-FFF2-40B4-BE49-F238E27FC236}">
-                <a16:creationId xmlns:a16="http://schemas.microsoft.com/office/drawing/2014/main" id="{04D22BEE-2E8E-EB5A-10B7-9A8347E49C5F}"/>
+                <a16:creationId xmlns:a16="http://schemas.microsoft.com/office/drawing/2014/main" xmlns="" id="{04D22BEE-2E8E-EB5A-10B7-9A8347E49C5F}"/>
               </a:ext>
             </a:extLst>
           </p:cNvPr>
@@ -9454,10 +9631,10 @@
           <p:nvPr/>
         </p:nvPicPr>
         <p:blipFill>
-          <a:blip r:embed="rId4">
+          <a:blip r:embed="rId4" cstate="print">
             <a:extLst>
               <a:ext uri="{28A0092B-C50C-407E-A947-70E740481C1C}">
-                <a14:useLocalDpi xmlns:a14="http://schemas.microsoft.com/office/drawing/2010/main" val="0"/>
+                <a14:useLocalDpi xmlns:a14="http://schemas.microsoft.com/office/drawing/2010/main" xmlns="" val="0"/>
               </a:ext>
             </a:extLst>
           </a:blip>
@@ -9480,7 +9657,7 @@
           <p:cNvPr id="7" name="文本框 6">
             <a:extLst>
               <a:ext uri="{FF2B5EF4-FFF2-40B4-BE49-F238E27FC236}">
-                <a16:creationId xmlns:a16="http://schemas.microsoft.com/office/drawing/2014/main" id="{056E0128-89F8-E986-A224-9AB33EBD49AF}"/>
+                <a16:creationId xmlns:a16="http://schemas.microsoft.com/office/drawing/2014/main" xmlns="" id="{056E0128-89F8-E986-A224-9AB33EBD49AF}"/>
               </a:ext>
             </a:extLst>
           </p:cNvPr>
@@ -9523,7 +9700,7 @@
           <p:cNvPr id="9" name="文本框 8">
             <a:extLst>
               <a:ext uri="{FF2B5EF4-FFF2-40B4-BE49-F238E27FC236}">
-                <a16:creationId xmlns:a16="http://schemas.microsoft.com/office/drawing/2014/main" id="{8A664973-B943-6E72-F64E-76DE1C36E839}"/>
+                <a16:creationId xmlns:a16="http://schemas.microsoft.com/office/drawing/2014/main" xmlns="" id="{8A664973-B943-6E72-F64E-76DE1C36E839}"/>
               </a:ext>
             </a:extLst>
           </p:cNvPr>
@@ -9564,13 +9741,20 @@
     </p:spTree>
     <p:extLst>
       <p:ext uri="{BB962C8B-B14F-4D97-AF65-F5344CB8AC3E}">
-        <p14:creationId xmlns:p14="http://schemas.microsoft.com/office/powerpoint/2010/main" val="1640402917"/>
+        <p14:creationId xmlns:p14="http://schemas.microsoft.com/office/powerpoint/2010/main" xmlns="" val="1640402917"/>
       </p:ext>
     </p:extLst>
   </p:cSld>
   <p:clrMapOvr>
     <a:masterClrMapping/>
   </p:clrMapOvr>
+  <p:timing>
+    <p:tnLst>
+      <p:par>
+        <p:cTn id="1" dur="indefinite" restart="never" nodeType="tmRoot"/>
+      </p:par>
+    </p:tnLst>
+  </p:timing>
 </p:sld>
 </file>
 
@@ -9656,7 +9840,7 @@
           <p:cNvPr id="5" name="Content Placeholder 2">
             <a:extLst>
               <a:ext uri="{FF2B5EF4-FFF2-40B4-BE49-F238E27FC236}">
-                <a16:creationId xmlns:a16="http://schemas.microsoft.com/office/drawing/2014/main" id="{22A1C46C-0F2B-62A6-587A-0349E7CF9B95}"/>
+                <a16:creationId xmlns:a16="http://schemas.microsoft.com/office/drawing/2014/main" xmlns="" id="{22A1C46C-0F2B-62A6-587A-0349E7CF9B95}"/>
               </a:ext>
             </a:extLst>
           </p:cNvPr>
@@ -10051,13 +10235,20 @@
     </p:spTree>
     <p:extLst>
       <p:ext uri="{BB962C8B-B14F-4D97-AF65-F5344CB8AC3E}">
-        <p14:creationId xmlns:p14="http://schemas.microsoft.com/office/powerpoint/2010/main" val="1553460984"/>
+        <p14:creationId xmlns:p14="http://schemas.microsoft.com/office/powerpoint/2010/main" xmlns="" val="1553460984"/>
       </p:ext>
     </p:extLst>
   </p:cSld>
   <p:clrMapOvr>
     <a:masterClrMapping/>
   </p:clrMapOvr>
+  <p:timing>
+    <p:tnLst>
+      <p:par>
+        <p:cTn id="1" dur="indefinite" restart="never" nodeType="tmRoot"/>
+      </p:par>
+    </p:tnLst>
+  </p:timing>
 </p:sld>
 </file>
 
@@ -10143,7 +10334,7 @@
           <p:cNvPr id="5" name="Content Placeholder 2">
             <a:extLst>
               <a:ext uri="{FF2B5EF4-FFF2-40B4-BE49-F238E27FC236}">
-                <a16:creationId xmlns:a16="http://schemas.microsoft.com/office/drawing/2014/main" id="{22A1C46C-0F2B-62A6-587A-0349E7CF9B95}"/>
+                <a16:creationId xmlns:a16="http://schemas.microsoft.com/office/drawing/2014/main" xmlns="" id="{22A1C46C-0F2B-62A6-587A-0349E7CF9B95}"/>
               </a:ext>
             </a:extLst>
           </p:cNvPr>
@@ -10394,7 +10585,29 @@
                   </a:schemeClr>
                 </a:solidFill>
               </a:rPr>
-              <a:t> Set a invalid value of opcode</a:t>
+              <a:t> Set a </a:t>
+            </a:r>
+            <a:r>
+              <a:rPr lang="en-US" altLang="zh-CN" sz="1700" b="1" dirty="0" smtClean="0">
+                <a:solidFill>
+                  <a:schemeClr val="tx1">
+                    <a:lumMod val="65000"/>
+                    <a:lumOff val="35000"/>
+                  </a:schemeClr>
+                </a:solidFill>
+              </a:rPr>
+              <a:t>RFU value </a:t>
+            </a:r>
+            <a:r>
+              <a:rPr lang="en-US" altLang="zh-CN" sz="1700" b="1" dirty="0">
+                <a:solidFill>
+                  <a:schemeClr val="tx1">
+                    <a:lumMod val="65000"/>
+                    <a:lumOff val="35000"/>
+                  </a:schemeClr>
+                </a:solidFill>
+              </a:rPr>
+              <a:t>of opcode</a:t>
             </a:r>
           </a:p>
           <a:p>
@@ -10508,13 +10721,20 @@
     </p:spTree>
     <p:extLst>
       <p:ext uri="{BB962C8B-B14F-4D97-AF65-F5344CB8AC3E}">
-        <p14:creationId xmlns:p14="http://schemas.microsoft.com/office/powerpoint/2010/main" val="1359625625"/>
+        <p14:creationId xmlns:p14="http://schemas.microsoft.com/office/powerpoint/2010/main" xmlns="" val="1359625625"/>
       </p:ext>
     </p:extLst>
   </p:cSld>
   <p:clrMapOvr>
     <a:masterClrMapping/>
   </p:clrMapOvr>
+  <p:timing>
+    <p:tnLst>
+      <p:par>
+        <p:cTn id="1" dur="indefinite" restart="never" nodeType="tmRoot"/>
+      </p:par>
+    </p:tnLst>
+  </p:timing>
 </p:sld>
 </file>
 
@@ -10649,7 +10869,7 @@
     </p:spTree>
     <p:extLst>
       <p:ext uri="{BB962C8B-B14F-4D97-AF65-F5344CB8AC3E}">
-        <p14:creationId xmlns:p14="http://schemas.microsoft.com/office/powerpoint/2010/main" val="1674439249"/>
+        <p14:creationId xmlns:p14="http://schemas.microsoft.com/office/powerpoint/2010/main" xmlns="" val="1674439249"/>
       </p:ext>
     </p:extLst>
   </p:cSld>
@@ -10657,6 +10877,13 @@
     <a:masterClrMapping/>
   </p:clrMapOvr>
   <p:transition/>
+  <p:timing>
+    <p:tnLst>
+      <p:par>
+        <p:cTn id="1" dur="indefinite" restart="never" nodeType="tmRoot"/>
+      </p:par>
+    </p:tnLst>
+  </p:timing>
 </p:sld>
 </file>
 
@@ -10754,8 +10981,31 @@
                 <a:latin typeface="Calibri" panose="020F0502020204030204" pitchFamily="34" charset="0"/>
                 <a:ea typeface="黑体" panose="02010609060101010101" pitchFamily="49" charset="-122"/>
               </a:rPr>
-              <a:t> ASE state management</a:t>
-            </a:r>
+              <a:t> ASE </a:t>
+            </a:r>
+            <a:r>
+              <a:rPr lang="en-US" altLang="zh-CN" sz="2200" b="1" dirty="0" smtClean="0">
+                <a:solidFill>
+                  <a:schemeClr val="tx1">
+                    <a:lumMod val="65000"/>
+                    <a:lumOff val="35000"/>
+                  </a:schemeClr>
+                </a:solidFill>
+                <a:latin typeface="Calibri" panose="020F0502020204030204" pitchFamily="34" charset="0"/>
+                <a:ea typeface="黑体" panose="02010609060101010101" pitchFamily="49" charset="-122"/>
+              </a:rPr>
+              <a:t>State Management</a:t>
+            </a:r>
+            <a:endParaRPr lang="en-US" altLang="zh-CN" sz="2200" b="1" dirty="0">
+              <a:solidFill>
+                <a:schemeClr val="tx1">
+                  <a:lumMod val="65000"/>
+                  <a:lumOff val="35000"/>
+                </a:schemeClr>
+              </a:solidFill>
+              <a:latin typeface="Calibri" panose="020F0502020204030204" pitchFamily="34" charset="0"/>
+              <a:ea typeface="黑体" panose="02010609060101010101" pitchFamily="49" charset="-122"/>
+            </a:endParaRPr>
           </a:p>
           <a:p>
             <a:r>
@@ -10923,7 +11173,7 @@
           <p:cNvPr id="4" name="内容占位符 2">
             <a:extLst>
               <a:ext uri="{FF2B5EF4-FFF2-40B4-BE49-F238E27FC236}">
-                <a16:creationId xmlns:a16="http://schemas.microsoft.com/office/drawing/2014/main" id="{99F0B74B-63DB-DAE0-012A-1090A9367972}"/>
+                <a16:creationId xmlns:a16="http://schemas.microsoft.com/office/drawing/2014/main" xmlns="" id="{99F0B74B-63DB-DAE0-012A-1090A9367972}"/>
               </a:ext>
             </a:extLst>
           </p:cNvPr>
@@ -11299,7 +11549,7 @@
           <p:cNvPr id="5" name="Content Placeholder 2">
             <a:extLst>
               <a:ext uri="{FF2B5EF4-FFF2-40B4-BE49-F238E27FC236}">
-                <a16:creationId xmlns:a16="http://schemas.microsoft.com/office/drawing/2014/main" id="{22A1C46C-0F2B-62A6-587A-0349E7CF9B95}"/>
+                <a16:creationId xmlns:a16="http://schemas.microsoft.com/office/drawing/2014/main" xmlns="" id="{22A1C46C-0F2B-62A6-587A-0349E7CF9B95}"/>
               </a:ext>
             </a:extLst>
           </p:cNvPr>
@@ -11618,13 +11868,20 @@
     </p:spTree>
     <p:extLst>
       <p:ext uri="{BB962C8B-B14F-4D97-AF65-F5344CB8AC3E}">
-        <p14:creationId xmlns:p14="http://schemas.microsoft.com/office/powerpoint/2010/main" val="1500857515"/>
+        <p14:creationId xmlns:p14="http://schemas.microsoft.com/office/powerpoint/2010/main" xmlns="" val="1500857515"/>
       </p:ext>
     </p:extLst>
   </p:cSld>
   <p:clrMapOvr>
     <a:masterClrMapping/>
   </p:clrMapOvr>
+  <p:timing>
+    <p:tnLst>
+      <p:par>
+        <p:cTn id="1" dur="indefinite" restart="never" nodeType="tmRoot"/>
+      </p:par>
+    </p:tnLst>
+  </p:timing>
 </p:sld>
 </file>
 
@@ -11710,7 +11967,7 @@
           <p:cNvPr id="5" name="Content Placeholder 2">
             <a:extLst>
               <a:ext uri="{FF2B5EF4-FFF2-40B4-BE49-F238E27FC236}">
-                <a16:creationId xmlns:a16="http://schemas.microsoft.com/office/drawing/2014/main" id="{22A1C46C-0F2B-62A6-587A-0349E7CF9B95}"/>
+                <a16:creationId xmlns:a16="http://schemas.microsoft.com/office/drawing/2014/main" xmlns="" id="{22A1C46C-0F2B-62A6-587A-0349E7CF9B95}"/>
               </a:ext>
             </a:extLst>
           </p:cNvPr>
@@ -12064,7 +12321,7 @@
           <p:cNvPr id="6" name="图片 5">
             <a:extLst>
               <a:ext uri="{FF2B5EF4-FFF2-40B4-BE49-F238E27FC236}">
-                <a16:creationId xmlns:a16="http://schemas.microsoft.com/office/drawing/2014/main" id="{96814890-CA5F-E8F0-325E-2A31330CBAA6}"/>
+                <a16:creationId xmlns:a16="http://schemas.microsoft.com/office/drawing/2014/main" xmlns="" id="{96814890-CA5F-E8F0-325E-2A31330CBAA6}"/>
               </a:ext>
             </a:extLst>
           </p:cNvPr>
@@ -12074,7 +12331,7 @@
           <p:nvPr/>
         </p:nvPicPr>
         <p:blipFill>
-          <a:blip r:embed="rId3"/>
+          <a:blip r:embed="rId3" cstate="print"/>
           <a:stretch>
             <a:fillRect/>
           </a:stretch>
@@ -12092,13 +12349,20 @@
     </p:spTree>
     <p:extLst>
       <p:ext uri="{BB962C8B-B14F-4D97-AF65-F5344CB8AC3E}">
-        <p14:creationId xmlns:p14="http://schemas.microsoft.com/office/powerpoint/2010/main" val="3444357675"/>
+        <p14:creationId xmlns:p14="http://schemas.microsoft.com/office/powerpoint/2010/main" xmlns="" val="3444357675"/>
       </p:ext>
     </p:extLst>
   </p:cSld>
   <p:clrMapOvr>
     <a:masterClrMapping/>
   </p:clrMapOvr>
+  <p:timing>
+    <p:tnLst>
+      <p:par>
+        <p:cTn id="1" dur="indefinite" restart="never" nodeType="tmRoot"/>
+      </p:par>
+    </p:tnLst>
+  </p:timing>
 </p:sld>
 </file>
 
@@ -12136,7 +12400,11 @@
           <a:p>
             <a:r>
               <a:rPr lang="en-US" altLang="zh-CN" dirty="0"/>
-              <a:t>ASE state management</a:t>
+              <a:t>ASE </a:t>
+            </a:r>
+            <a:r>
+              <a:rPr lang="en-US" altLang="zh-CN" dirty="0" smtClean="0"/>
+              <a:t>State Management</a:t>
             </a:r>
             <a:endParaRPr lang="zh-CN" altLang="en-US" dirty="0"/>
           </a:p>
@@ -12184,7 +12452,7 @@
           <p:cNvPr id="5" name="Content Placeholder 2">
             <a:extLst>
               <a:ext uri="{FF2B5EF4-FFF2-40B4-BE49-F238E27FC236}">
-                <a16:creationId xmlns:a16="http://schemas.microsoft.com/office/drawing/2014/main" id="{22A1C46C-0F2B-62A6-587A-0349E7CF9B95}"/>
+                <a16:creationId xmlns:a16="http://schemas.microsoft.com/office/drawing/2014/main" xmlns="" id="{22A1C46C-0F2B-62A6-587A-0349E7CF9B95}"/>
               </a:ext>
             </a:extLst>
           </p:cNvPr>
@@ -12425,10 +12693,43 @@
                   </a:schemeClr>
                 </a:solidFill>
               </a:rPr>
-              <a:t>aintained by the server and shared with a client using ASE characteristics.</a:t>
-            </a:r>
-          </a:p>
-          <a:p>
+              <a:t>aintained by the server and shared with </a:t>
+            </a:r>
+            <a:r>
+              <a:rPr lang="en-US" sz="2200" dirty="0" smtClean="0">
+                <a:solidFill>
+                  <a:schemeClr val="tx1">
+                    <a:lumMod val="65000"/>
+                    <a:lumOff val="35000"/>
+                  </a:schemeClr>
+                </a:solidFill>
+              </a:rPr>
+              <a:t>a</a:t>
+            </a:r>
+          </a:p>
+          <a:p>
+            <a:pPr>
+              <a:buNone/>
+            </a:pPr>
+            <a:r>
+              <a:rPr lang="en-US" dirty="0" smtClean="0"/>
+              <a:t> </a:t>
+            </a:r>
+            <a:r>
+              <a:rPr lang="en-US" dirty="0" smtClean="0"/>
+              <a:t>    </a:t>
+            </a:r>
+            <a:r>
+              <a:rPr lang="en-US" sz="2200" dirty="0" smtClean="0">
+                <a:solidFill>
+                  <a:schemeClr val="tx1">
+                    <a:lumMod val="65000"/>
+                    <a:lumOff val="35000"/>
+                  </a:schemeClr>
+                </a:solidFill>
+              </a:rPr>
+              <a:t> </a:t>
+            </a:r>
             <a:r>
               <a:rPr lang="en-US" sz="2200" dirty="0">
                 <a:solidFill>
@@ -12438,6 +12739,19 @@
                   </a:schemeClr>
                 </a:solidFill>
               </a:rPr>
+              <a:t>client using ASE characteristics.</a:t>
+            </a:r>
+          </a:p>
+          <a:p>
+            <a:r>
+              <a:rPr lang="en-US" sz="2200" dirty="0">
+                <a:solidFill>
+                  <a:schemeClr val="tx1">
+                    <a:lumMod val="65000"/>
+                    <a:lumOff val="35000"/>
+                  </a:schemeClr>
+                </a:solidFill>
+              </a:rPr>
               <a:t> State(</a:t>
             </a:r>
             <a:r>
@@ -12466,7 +12780,21 @@
           <a:p>
             <a:r>
               <a:rPr lang="en-US" dirty="0"/>
-              <a:t> Client can control state machine by writing to the ASE Control Point characteristics</a:t>
+              <a:t> Client can control state machine by writing to </a:t>
+            </a:r>
+            <a:endParaRPr lang="en-US" dirty="0" smtClean="0"/>
+          </a:p>
+          <a:p>
+            <a:pPr>
+              <a:buNone/>
+            </a:pPr>
+            <a:r>
+              <a:rPr lang="en-US" dirty="0" smtClean="0"/>
+              <a:t>      the </a:t>
+            </a:r>
+            <a:r>
+              <a:rPr lang="en-US" dirty="0"/>
+              <a:t>ASE Control Point characteristics</a:t>
             </a:r>
           </a:p>
           <a:p>
@@ -12534,16 +12862,181 @@
           </a:p>
         </p:txBody>
       </p:sp>
+      <p:pic>
+        <p:nvPicPr>
+          <p:cNvPr id="6" name="图片 5">
+            <a:extLst>
+              <a:ext uri="{FF2B5EF4-FFF2-40B4-BE49-F238E27FC236}">
+                <a16:creationId xmlns:a16="http://schemas.microsoft.com/office/drawing/2014/main" xmlns="" id="{6DA5B60B-56FA-8022-157A-3B2D7BFE2A12}"/>
+              </a:ext>
+            </a:extLst>
+          </p:cNvPr>
+          <p:cNvPicPr>
+            <a:picLocks noChangeAspect="1"/>
+          </p:cNvPicPr>
+          <p:nvPr/>
+        </p:nvPicPr>
+        <p:blipFill>
+          <a:blip r:embed="rId3" cstate="print">
+            <a:extLst>
+              <a:ext uri="{28A0092B-C50C-407E-A947-70E740481C1C}">
+                <a14:useLocalDpi xmlns:a14="http://schemas.microsoft.com/office/drawing/2010/main" xmlns="" val="0"/>
+              </a:ext>
+            </a:extLst>
+          </a:blip>
+          <a:stretch>
+            <a:fillRect/>
+          </a:stretch>
+        </p:blipFill>
+        <p:spPr>
+          <a:xfrm>
+            <a:off x="6657559" y="171224"/>
+            <a:ext cx="5534441" cy="2934132"/>
+          </a:xfrm>
+          <a:prstGeom prst="rect">
+            <a:avLst/>
+          </a:prstGeom>
+        </p:spPr>
+      </p:pic>
+      <p:pic>
+        <p:nvPicPr>
+          <p:cNvPr id="7" name="图片 6">
+            <a:extLst>
+              <a:ext uri="{FF2B5EF4-FFF2-40B4-BE49-F238E27FC236}">
+                <a16:creationId xmlns:a16="http://schemas.microsoft.com/office/drawing/2014/main" xmlns="" id="{3A04F159-9C38-D769-0837-EF7D4119DF98}"/>
+              </a:ext>
+            </a:extLst>
+          </p:cNvPr>
+          <p:cNvPicPr>
+            <a:picLocks noChangeAspect="1"/>
+          </p:cNvPicPr>
+          <p:nvPr/>
+        </p:nvPicPr>
+        <p:blipFill>
+          <a:blip r:embed="rId4" cstate="print">
+            <a:extLst>
+              <a:ext uri="{28A0092B-C50C-407E-A947-70E740481C1C}">
+                <a14:useLocalDpi xmlns:a14="http://schemas.microsoft.com/office/drawing/2010/main" xmlns="" val="0"/>
+              </a:ext>
+            </a:extLst>
+          </a:blip>
+          <a:stretch>
+            <a:fillRect/>
+          </a:stretch>
+        </p:blipFill>
+        <p:spPr>
+          <a:xfrm>
+            <a:off x="6974296" y="3105356"/>
+            <a:ext cx="5217704" cy="3109326"/>
+          </a:xfrm>
+          <a:prstGeom prst="rect">
+            <a:avLst/>
+          </a:prstGeom>
+        </p:spPr>
+      </p:pic>
+      <p:sp>
+        <p:nvSpPr>
+          <p:cNvPr id="8" name="文本框 8">
+            <a:extLst>
+              <a:ext uri="{FF2B5EF4-FFF2-40B4-BE49-F238E27FC236}">
+                <a16:creationId xmlns:a16="http://schemas.microsoft.com/office/drawing/2014/main" xmlns="" id="{DB2B70AA-413D-71AC-E231-E48E938BE39A}"/>
+              </a:ext>
+            </a:extLst>
+          </p:cNvPr>
+          <p:cNvSpPr txBox="1"/>
+          <p:nvPr/>
+        </p:nvSpPr>
+        <p:spPr>
+          <a:xfrm>
+            <a:off x="11075203" y="2822531"/>
+            <a:ext cx="1025505" cy="369332"/>
+          </a:xfrm>
+          <a:prstGeom prst="rect">
+            <a:avLst/>
+          </a:prstGeom>
+          <a:noFill/>
+        </p:spPr>
+        <p:txBody>
+          <a:bodyPr wrap="square">
+            <a:spAutoFit/>
+          </a:bodyPr>
+          <a:lstStyle/>
+          <a:p>
+            <a:r>
+              <a:rPr lang="en-US" altLang="zh-CN" sz="1800" b="1" dirty="0">
+                <a:solidFill>
+                  <a:schemeClr val="tx1">
+                    <a:lumMod val="65000"/>
+                    <a:lumOff val="35000"/>
+                  </a:schemeClr>
+                </a:solidFill>
+              </a:rPr>
+              <a:t>Sink ASE</a:t>
+            </a:r>
+            <a:endParaRPr lang="zh-CN" altLang="en-US" dirty="0"/>
+          </a:p>
+        </p:txBody>
+      </p:sp>
+      <p:sp>
+        <p:nvSpPr>
+          <p:cNvPr id="9" name="文本框 9">
+            <a:extLst>
+              <a:ext uri="{FF2B5EF4-FFF2-40B4-BE49-F238E27FC236}">
+                <a16:creationId xmlns:a16="http://schemas.microsoft.com/office/drawing/2014/main" xmlns="" id="{3C121D12-248A-6A20-387A-C12FF25FFB7C}"/>
+              </a:ext>
+            </a:extLst>
+          </p:cNvPr>
+          <p:cNvSpPr txBox="1"/>
+          <p:nvPr/>
+        </p:nvSpPr>
+        <p:spPr>
+          <a:xfrm>
+            <a:off x="7541203" y="5951066"/>
+            <a:ext cx="1281134" cy="369332"/>
+          </a:xfrm>
+          <a:prstGeom prst="rect">
+            <a:avLst/>
+          </a:prstGeom>
+          <a:noFill/>
+        </p:spPr>
+        <p:txBody>
+          <a:bodyPr wrap="square">
+            <a:spAutoFit/>
+          </a:bodyPr>
+          <a:lstStyle/>
+          <a:p>
+            <a:r>
+              <a:rPr lang="en-US" altLang="zh-CN" sz="1800" b="1" dirty="0">
+                <a:solidFill>
+                  <a:schemeClr val="tx1">
+                    <a:lumMod val="65000"/>
+                    <a:lumOff val="35000"/>
+                  </a:schemeClr>
+                </a:solidFill>
+              </a:rPr>
+              <a:t>Source ASE</a:t>
+            </a:r>
+            <a:endParaRPr lang="zh-CN" altLang="en-US" dirty="0"/>
+          </a:p>
+        </p:txBody>
+      </p:sp>
     </p:spTree>
     <p:extLst>
       <p:ext uri="{BB962C8B-B14F-4D97-AF65-F5344CB8AC3E}">
-        <p14:creationId xmlns:p14="http://schemas.microsoft.com/office/powerpoint/2010/main" val="2937746523"/>
+        <p14:creationId xmlns:p14="http://schemas.microsoft.com/office/powerpoint/2010/main" xmlns="" val="2937746523"/>
       </p:ext>
     </p:extLst>
   </p:cSld>
   <p:clrMapOvr>
     <a:masterClrMapping/>
   </p:clrMapOvr>
+  <p:timing>
+    <p:tnLst>
+      <p:par>
+        <p:cTn id="1" dur="indefinite" restart="never" nodeType="tmRoot"/>
+      </p:par>
+    </p:tnLst>
+  </p:timing>
 </p:sld>
 </file>
 
@@ -12629,7 +13122,7 @@
           <p:cNvPr id="5" name="Content Placeholder 2">
             <a:extLst>
               <a:ext uri="{FF2B5EF4-FFF2-40B4-BE49-F238E27FC236}">
-                <a16:creationId xmlns:a16="http://schemas.microsoft.com/office/drawing/2014/main" id="{22A1C46C-0F2B-62A6-587A-0349E7CF9B95}"/>
+                <a16:creationId xmlns:a16="http://schemas.microsoft.com/office/drawing/2014/main" xmlns="" id="{22A1C46C-0F2B-62A6-587A-0349E7CF9B95}"/>
               </a:ext>
             </a:extLst>
           </p:cNvPr>
@@ -12984,7 +13477,7 @@
           <p:cNvPr id="7" name="图片 6">
             <a:extLst>
               <a:ext uri="{FF2B5EF4-FFF2-40B4-BE49-F238E27FC236}">
-                <a16:creationId xmlns:a16="http://schemas.microsoft.com/office/drawing/2014/main" id="{27978F74-16A4-FDFD-230A-12A179FE7573}"/>
+                <a16:creationId xmlns:a16="http://schemas.microsoft.com/office/drawing/2014/main" xmlns="" id="{27978F74-16A4-FDFD-230A-12A179FE7573}"/>
               </a:ext>
             </a:extLst>
           </p:cNvPr>
@@ -12994,10 +13487,10 @@
           <p:nvPr/>
         </p:nvPicPr>
         <p:blipFill>
-          <a:blip r:embed="rId3">
+          <a:blip r:embed="rId3" cstate="print">
             <a:extLst>
               <a:ext uri="{28A0092B-C50C-407E-A947-70E740481C1C}">
-                <a14:useLocalDpi xmlns:a14="http://schemas.microsoft.com/office/drawing/2010/main" val="0"/>
+                <a14:useLocalDpi xmlns:a14="http://schemas.microsoft.com/office/drawing/2010/main" xmlns="" val="0"/>
               </a:ext>
             </a:extLst>
           </a:blip>
@@ -13018,13 +13511,20 @@
     </p:spTree>
     <p:extLst>
       <p:ext uri="{BB962C8B-B14F-4D97-AF65-F5344CB8AC3E}">
-        <p14:creationId xmlns:p14="http://schemas.microsoft.com/office/powerpoint/2010/main" val="2837518521"/>
+        <p14:creationId xmlns:p14="http://schemas.microsoft.com/office/powerpoint/2010/main" xmlns="" val="2837518521"/>
       </p:ext>
     </p:extLst>
   </p:cSld>
   <p:clrMapOvr>
     <a:masterClrMapping/>
   </p:clrMapOvr>
+  <p:timing>
+    <p:tnLst>
+      <p:par>
+        <p:cTn id="1" dur="indefinite" restart="never" nodeType="tmRoot"/>
+      </p:par>
+    </p:tnLst>
+  </p:timing>
 </p:sld>
 </file>
 
@@ -13110,7 +13610,7 @@
           <p:cNvPr id="5" name="Content Placeholder 2">
             <a:extLst>
               <a:ext uri="{FF2B5EF4-FFF2-40B4-BE49-F238E27FC236}">
-                <a16:creationId xmlns:a16="http://schemas.microsoft.com/office/drawing/2014/main" id="{22A1C46C-0F2B-62A6-587A-0349E7CF9B95}"/>
+                <a16:creationId xmlns:a16="http://schemas.microsoft.com/office/drawing/2014/main" xmlns="" id="{22A1C46C-0F2B-62A6-587A-0349E7CF9B95}"/>
               </a:ext>
             </a:extLst>
           </p:cNvPr>
@@ -13369,13 +13869,20 @@
     </p:spTree>
     <p:extLst>
       <p:ext uri="{BB962C8B-B14F-4D97-AF65-F5344CB8AC3E}">
-        <p14:creationId xmlns:p14="http://schemas.microsoft.com/office/powerpoint/2010/main" val="4087852957"/>
+        <p14:creationId xmlns:p14="http://schemas.microsoft.com/office/powerpoint/2010/main" xmlns="" val="4087852957"/>
       </p:ext>
     </p:extLst>
   </p:cSld>
   <p:clrMapOvr>
     <a:masterClrMapping/>
   </p:clrMapOvr>
+  <p:timing>
+    <p:tnLst>
+      <p:par>
+        <p:cTn id="1" dur="indefinite" restart="never" nodeType="tmRoot"/>
+      </p:par>
+    </p:tnLst>
+  </p:timing>
 </p:sld>
 </file>
 
@@ -13461,7 +13968,7 @@
           <p:cNvPr id="5" name="Content Placeholder 2">
             <a:extLst>
               <a:ext uri="{FF2B5EF4-FFF2-40B4-BE49-F238E27FC236}">
-                <a16:creationId xmlns:a16="http://schemas.microsoft.com/office/drawing/2014/main" id="{22A1C46C-0F2B-62A6-587A-0349E7CF9B95}"/>
+                <a16:creationId xmlns:a16="http://schemas.microsoft.com/office/drawing/2014/main" xmlns="" id="{22A1C46C-0F2B-62A6-587A-0349E7CF9B95}"/>
               </a:ext>
             </a:extLst>
           </p:cNvPr>
@@ -13473,7 +13980,7 @@
         <p:spPr>
           <a:xfrm>
             <a:off x="752888" y="927290"/>
-            <a:ext cx="11353800" cy="5230811"/>
+            <a:ext cx="11353800" cy="5432567"/>
           </a:xfrm>
           <a:prstGeom prst="rect">
             <a:avLst/>
@@ -13714,14 +14221,85 @@
                   </a:schemeClr>
                 </a:solidFill>
               </a:rPr>
-              <a:t>Success: send a notification of ASE Control Point to client. Can </a:t>
-            </a:r>
-          </a:p>
-          <a:p>
-            <a:pPr marL="457200" lvl="1" indent="0">
+              <a:t>Success: </a:t>
+            </a:r>
+            <a:r>
+              <a:rPr lang="en-US" b="1" dirty="0">
+                <a:solidFill>
+                  <a:srgbClr val="B60005"/>
+                </a:solidFill>
+              </a:rPr>
+              <a:t>send a notification </a:t>
+            </a:r>
+            <a:r>
+              <a:rPr lang="en-US" b="1" dirty="0">
+                <a:solidFill>
+                  <a:schemeClr val="tx1">
+                    <a:lumMod val="65000"/>
+                    <a:lumOff val="35000"/>
+                  </a:schemeClr>
+                </a:solidFill>
+              </a:rPr>
+              <a:t>of ASE Control Point to client. </a:t>
+            </a:r>
+            <a:endParaRPr lang="en-US" b="1" dirty="0" smtClean="0">
+              <a:solidFill>
+                <a:schemeClr val="tx1">
+                  <a:lumMod val="65000"/>
+                  <a:lumOff val="35000"/>
+                </a:schemeClr>
+              </a:solidFill>
+            </a:endParaRPr>
+          </a:p>
+          <a:p>
+            <a:pPr lvl="1">
               <a:buNone/>
             </a:pPr>
             <a:r>
+              <a:rPr lang="en-US" b="1" dirty="0" smtClean="0">
+                <a:solidFill>
+                  <a:schemeClr val="tx1">
+                    <a:lumMod val="65000"/>
+                    <a:lumOff val="35000"/>
+                  </a:schemeClr>
+                </a:solidFill>
+              </a:rPr>
+              <a:t> </a:t>
+            </a:r>
+            <a:r>
+              <a:rPr lang="en-US" b="1" dirty="0" smtClean="0">
+                <a:solidFill>
+                  <a:schemeClr val="tx1">
+                    <a:lumMod val="65000"/>
+                    <a:lumOff val="35000"/>
+                  </a:schemeClr>
+                </a:solidFill>
+              </a:rPr>
+              <a:t>     </a:t>
+            </a:r>
+            <a:r>
+              <a:rPr lang="en-US" b="1" dirty="0" smtClean="0">
+                <a:solidFill>
+                  <a:schemeClr val="tx1">
+                    <a:lumMod val="65000"/>
+                    <a:lumOff val="35000"/>
+                  </a:schemeClr>
+                </a:solidFill>
+              </a:rPr>
+              <a:t>Can </a:t>
+            </a:r>
+            <a:r>
+              <a:rPr lang="en-US" altLang="zh-CN" b="1" dirty="0" smtClean="0">
+                <a:solidFill>
+                  <a:schemeClr val="tx1">
+                    <a:lumMod val="65000"/>
+                    <a:lumOff val="35000"/>
+                  </a:schemeClr>
+                </a:solidFill>
+              </a:rPr>
+              <a:t>execute </a:t>
+            </a:r>
+            <a:r>
               <a:rPr lang="en-US" altLang="zh-CN" b="1" dirty="0">
                 <a:solidFill>
                   <a:schemeClr val="tx1">
@@ -13730,7 +14308,7 @@
                   </a:schemeClr>
                 </a:solidFill>
               </a:rPr>
-              <a:t>     execute all of the operations </a:t>
+              <a:t>all of the operations </a:t>
             </a:r>
             <a:r>
               <a:rPr lang="en-US" altLang="zh-CN" b="1" dirty="0">
@@ -13967,7 +14545,7 @@
           <p:cNvPr id="9" name="图片 8">
             <a:extLst>
               <a:ext uri="{FF2B5EF4-FFF2-40B4-BE49-F238E27FC236}">
-                <a16:creationId xmlns:a16="http://schemas.microsoft.com/office/drawing/2014/main" id="{A3B4E371-82B6-4BF3-F05F-20B06A8A80A5}"/>
+                <a16:creationId xmlns:a16="http://schemas.microsoft.com/office/drawing/2014/main" xmlns="" id="{A3B4E371-82B6-4BF3-F05F-20B06A8A80A5}"/>
               </a:ext>
             </a:extLst>
           </p:cNvPr>
@@ -13977,10 +14555,10 @@
           <p:nvPr/>
         </p:nvPicPr>
         <p:blipFill>
-          <a:blip r:embed="rId3">
+          <a:blip r:embed="rId3" cstate="print">
             <a:extLst>
               <a:ext uri="{28A0092B-C50C-407E-A947-70E740481C1C}">
-                <a14:useLocalDpi xmlns:a14="http://schemas.microsoft.com/office/drawing/2010/main" val="0"/>
+                <a14:useLocalDpi xmlns:a14="http://schemas.microsoft.com/office/drawing/2010/main" xmlns="" val="0"/>
               </a:ext>
             </a:extLst>
           </a:blip>
@@ -14003,7 +14581,7 @@
           <p:cNvPr id="10" name="图片 9">
             <a:extLst>
               <a:ext uri="{FF2B5EF4-FFF2-40B4-BE49-F238E27FC236}">
-                <a16:creationId xmlns:a16="http://schemas.microsoft.com/office/drawing/2014/main" id="{A839AF52-A3A5-C24E-AB01-03C9D74B9E0B}"/>
+                <a16:creationId xmlns:a16="http://schemas.microsoft.com/office/drawing/2014/main" xmlns="" id="{A839AF52-A3A5-C24E-AB01-03C9D74B9E0B}"/>
               </a:ext>
             </a:extLst>
           </p:cNvPr>
@@ -14013,10 +14591,10 @@
           <p:nvPr/>
         </p:nvPicPr>
         <p:blipFill>
-          <a:blip r:embed="rId4">
+          <a:blip r:embed="rId4" cstate="print">
             <a:extLst>
               <a:ext uri="{28A0092B-C50C-407E-A947-70E740481C1C}">
-                <a14:useLocalDpi xmlns:a14="http://schemas.microsoft.com/office/drawing/2010/main" val="0"/>
+                <a14:useLocalDpi xmlns:a14="http://schemas.microsoft.com/office/drawing/2010/main" xmlns="" val="0"/>
               </a:ext>
             </a:extLst>
           </a:blip>
@@ -14039,7 +14617,7 @@
           <p:cNvPr id="11" name="文本框 10">
             <a:extLst>
               <a:ext uri="{FF2B5EF4-FFF2-40B4-BE49-F238E27FC236}">
-                <a16:creationId xmlns:a16="http://schemas.microsoft.com/office/drawing/2014/main" id="{CF5C450C-B7C6-F19D-D8A3-D9ADC923CBD5}"/>
+                <a16:creationId xmlns:a16="http://schemas.microsoft.com/office/drawing/2014/main" xmlns="" id="{CF5C450C-B7C6-F19D-D8A3-D9ADC923CBD5}"/>
               </a:ext>
             </a:extLst>
           </p:cNvPr>
@@ -14082,7 +14660,7 @@
           <p:cNvPr id="12" name="文本框 11">
             <a:extLst>
               <a:ext uri="{FF2B5EF4-FFF2-40B4-BE49-F238E27FC236}">
-                <a16:creationId xmlns:a16="http://schemas.microsoft.com/office/drawing/2014/main" id="{6F302780-4DD0-261A-6E71-4AD6FF2646A2}"/>
+                <a16:creationId xmlns:a16="http://schemas.microsoft.com/office/drawing/2014/main" xmlns="" id="{6F302780-4DD0-261A-6E71-4AD6FF2646A2}"/>
               </a:ext>
             </a:extLst>
           </p:cNvPr>
@@ -14123,13 +14701,20 @@
     </p:spTree>
     <p:extLst>
       <p:ext uri="{BB962C8B-B14F-4D97-AF65-F5344CB8AC3E}">
-        <p14:creationId xmlns:p14="http://schemas.microsoft.com/office/powerpoint/2010/main" val="2605286457"/>
+        <p14:creationId xmlns:p14="http://schemas.microsoft.com/office/powerpoint/2010/main" xmlns="" val="2605286457"/>
       </p:ext>
     </p:extLst>
   </p:cSld>
   <p:clrMapOvr>
     <a:masterClrMapping/>
   </p:clrMapOvr>
+  <p:timing>
+    <p:tnLst>
+      <p:par>
+        <p:cTn id="1" dur="indefinite" restart="never" nodeType="tmRoot"/>
+      </p:par>
+    </p:tnLst>
+  </p:timing>
 </p:sld>
 </file>
 
@@ -14388,7 +14973,7 @@
   <a:extraClrSchemeLst/>
   <a:extLst>
     <a:ext uri="{05A4C25C-085E-4340-85A3-A5531E510DB2}">
-      <thm15:themeFamily xmlns:thm15="http://schemas.microsoft.com/office/thememl/2012/main" name="Verisilicon.potx" id="{FDBC567A-7401-48F2-9DB1-50BE690A71C5}" vid="{180BCB8E-B893-4899-AF0D-9AC6A25B1217}"/>
+      <thm15:themeFamily xmlns:thm15="http://schemas.microsoft.com/office/thememl/2012/main" xmlns="" name="Verisilicon.potx" id="{FDBC567A-7401-48F2-9DB1-50BE690A71C5}" vid="{180BCB8E-B893-4899-AF0D-9AC6A25B1217}"/>
     </a:ext>
   </a:extLst>
 </a:theme>
@@ -14683,7 +15268,7 @@
   <a:extraClrSchemeLst/>
   <a:extLst>
     <a:ext uri="{05A4C25C-085E-4340-85A3-A5531E510DB2}">
-      <thm15:themeFamily xmlns:thm15="http://schemas.microsoft.com/office/thememl/2012/main" name="Office Theme" id="{62F939B6-93AF-4DB8-9C6B-D6C7DFDC589F}" vid="{4A3C46E8-61CC-4603-A589-7422A47A8E4A}"/>
+      <thm15:themeFamily xmlns:thm15="http://schemas.microsoft.com/office/thememl/2012/main" xmlns="" name="Office Theme" id="{62F939B6-93AF-4DB8-9C6B-D6C7DFDC589F}" vid="{4A3C46E8-61CC-4603-A589-7422A47A8E4A}"/>
     </a:ext>
   </a:extLst>
 </a:theme>
@@ -14944,7 +15529,7 @@
   <a:extraClrSchemeLst/>
   <a:extLst>
     <a:ext uri="{05A4C25C-085E-4340-85A3-A5531E510DB2}">
-      <thm15:themeFamily xmlns:thm15="http://schemas.microsoft.com/office/thememl/2012/main" name="Office Theme" id="{62F939B6-93AF-4DB8-9C6B-D6C7DFDC589F}" vid="{4A3C46E8-61CC-4603-A589-7422A47A8E4A}"/>
+      <thm15:themeFamily xmlns:thm15="http://schemas.microsoft.com/office/thememl/2012/main" xmlns="" name="Office Theme" id="{62F939B6-93AF-4DB8-9C6B-D6C7DFDC589F}" vid="{4A3C46E8-61CC-4603-A589-7422A47A8E4A}"/>
     </a:ext>
   </a:extLst>
 </a:theme>

</xml_diff>